<commit_message>
Added a second slide as another option.
</commit_message>
<xml_diff>
--- a/WEBRTC_Slide.pptx
+++ b/WEBRTC_Slide.pptx
@@ -5,10 +5,11 @@
     <p:sldMasterId id="2147483648" r:id="rId1"/>
   </p:sldMasterIdLst>
   <p:notesMasterIdLst>
-    <p:notesMasterId r:id="rId3"/>
+    <p:notesMasterId r:id="rId4"/>
   </p:notesMasterIdLst>
   <p:sldIdLst>
     <p:sldId id="258" r:id="rId2"/>
+    <p:sldId id="260" r:id="rId3"/>
   </p:sldIdLst>
   <p:sldSz cx="12192000" cy="6858000"/>
   <p:notesSz cx="6858000" cy="9144000"/>
@@ -107,6 +108,11 @@
       </a:defRPr>
     </a:lvl9pPr>
   </p:defaultTextStyle>
+  <p:extLst>
+    <p:ext uri="{EFAFB233-063F-42B5-8137-9DF3F51BA10A}">
+      <p15:sldGuideLst xmlns:p15="http://schemas.microsoft.com/office/powerpoint/2012/main"/>
+    </p:ext>
+  </p:extLst>
 </p:presentation>
 </file>
 
@@ -192,7 +198,7 @@
           <a:p>
             <a:fld id="{712FDD25-0D0D-E545-910A-0E0EB599F49F}" type="datetimeFigureOut">
               <a:rPr lang="en-US" smtClean="0"/>
-              <a:t>11/30/20</a:t>
+              <a:t>12/1/20</a:t>
             </a:fld>
             <a:endParaRPr lang="en-US"/>
           </a:p>
@@ -543,6 +549,90 @@
 </p:notes>
 </file>
 
+<file path=ppt/notesSlides/notesSlide2.xml><?xml version="1.0" encoding="utf-8"?>
+<p:notes xmlns:a="http://schemas.openxmlformats.org/drawingml/2006/main" xmlns:r="http://schemas.openxmlformats.org/officeDocument/2006/relationships" xmlns:p="http://schemas.openxmlformats.org/presentationml/2006/main">
+  <p:cSld>
+    <p:spTree>
+      <p:nvGrpSpPr>
+        <p:cNvPr id="1" name=""/>
+        <p:cNvGrpSpPr/>
+        <p:nvPr/>
+      </p:nvGrpSpPr>
+      <p:grpSpPr>
+        <a:xfrm>
+          <a:off x="0" y="0"/>
+          <a:ext cx="0" cy="0"/>
+          <a:chOff x="0" y="0"/>
+          <a:chExt cx="0" cy="0"/>
+        </a:xfrm>
+      </p:grpSpPr>
+      <p:sp>
+        <p:nvSpPr>
+          <p:cNvPr id="2" name="Slide Image Placeholder 1"/>
+          <p:cNvSpPr>
+            <a:spLocks noGrp="1" noRot="1" noChangeAspect="1"/>
+          </p:cNvSpPr>
+          <p:nvPr>
+            <p:ph type="sldImg"/>
+          </p:nvPr>
+        </p:nvSpPr>
+        <p:spPr/>
+      </p:sp>
+      <p:sp>
+        <p:nvSpPr>
+          <p:cNvPr id="3" name="Notes Placeholder 2"/>
+          <p:cNvSpPr>
+            <a:spLocks noGrp="1"/>
+          </p:cNvSpPr>
+          <p:nvPr>
+            <p:ph type="body" idx="1"/>
+          </p:nvPr>
+        </p:nvSpPr>
+        <p:spPr/>
+        <p:txBody>
+          <a:bodyPr/>
+          <a:lstStyle/>
+          <a:p>
+            <a:endParaRPr lang="en-US" dirty="0"/>
+          </a:p>
+        </p:txBody>
+      </p:sp>
+      <p:sp>
+        <p:nvSpPr>
+          <p:cNvPr id="4" name="Slide Number Placeholder 3"/>
+          <p:cNvSpPr>
+            <a:spLocks noGrp="1"/>
+          </p:cNvSpPr>
+          <p:nvPr>
+            <p:ph type="sldNum" sz="quarter" idx="5"/>
+          </p:nvPr>
+        </p:nvSpPr>
+        <p:spPr/>
+        <p:txBody>
+          <a:bodyPr/>
+          <a:lstStyle/>
+          <a:p>
+            <a:fld id="{B01CE2AF-6066-874B-9DB5-81EA430FF304}" type="slidenum">
+              <a:rPr lang="en-US" smtClean="0"/>
+              <a:t>2</a:t>
+            </a:fld>
+            <a:endParaRPr lang="en-US"/>
+          </a:p>
+        </p:txBody>
+      </p:sp>
+    </p:spTree>
+    <p:extLst>
+      <p:ext uri="{BB962C8B-B14F-4D97-AF65-F5344CB8AC3E}">
+        <p14:creationId xmlns:p14="http://schemas.microsoft.com/office/powerpoint/2010/main" val="2972221638"/>
+      </p:ext>
+    </p:extLst>
+  </p:cSld>
+  <p:clrMapOvr>
+    <a:masterClrMapping/>
+  </p:clrMapOvr>
+</p:notes>
+</file>
+
 <file path=ppt/slideLayouts/slideLayout1.xml><?xml version="1.0" encoding="utf-8"?>
 <p:sldLayout xmlns:a="http://schemas.openxmlformats.org/drawingml/2006/main" xmlns:r="http://schemas.openxmlformats.org/officeDocument/2006/relationships" xmlns:p="http://schemas.openxmlformats.org/presentationml/2006/main" type="title" preserve="1">
   <p:cSld name="Title Slide">
@@ -690,7 +780,7 @@
           <a:p>
             <a:fld id="{C76C56C1-BAF5-9E4C-8987-3C0F093AB4FB}" type="datetimeFigureOut">
               <a:rPr lang="en-US" smtClean="0"/>
-              <a:t>11/30/20</a:t>
+              <a:t>12/1/20</a:t>
             </a:fld>
             <a:endParaRPr lang="en-US"/>
           </a:p>
@@ -888,7 +978,7 @@
           <a:p>
             <a:fld id="{C76C56C1-BAF5-9E4C-8987-3C0F093AB4FB}" type="datetimeFigureOut">
               <a:rPr lang="en-US" smtClean="0"/>
-              <a:t>11/30/20</a:t>
+              <a:t>12/1/20</a:t>
             </a:fld>
             <a:endParaRPr lang="en-US"/>
           </a:p>
@@ -1096,7 +1186,7 @@
           <a:p>
             <a:fld id="{C76C56C1-BAF5-9E4C-8987-3C0F093AB4FB}" type="datetimeFigureOut">
               <a:rPr lang="en-US" smtClean="0"/>
-              <a:t>11/30/20</a:t>
+              <a:t>12/1/20</a:t>
             </a:fld>
             <a:endParaRPr lang="en-US"/>
           </a:p>
@@ -1294,7 +1384,7 @@
           <a:p>
             <a:fld id="{C76C56C1-BAF5-9E4C-8987-3C0F093AB4FB}" type="datetimeFigureOut">
               <a:rPr lang="en-US" smtClean="0"/>
-              <a:t>11/30/20</a:t>
+              <a:t>12/1/20</a:t>
             </a:fld>
             <a:endParaRPr lang="en-US"/>
           </a:p>
@@ -1569,7 +1659,7 @@
           <a:p>
             <a:fld id="{C76C56C1-BAF5-9E4C-8987-3C0F093AB4FB}" type="datetimeFigureOut">
               <a:rPr lang="en-US" smtClean="0"/>
-              <a:t>11/30/20</a:t>
+              <a:t>12/1/20</a:t>
             </a:fld>
             <a:endParaRPr lang="en-US"/>
           </a:p>
@@ -1834,7 +1924,7 @@
           <a:p>
             <a:fld id="{C76C56C1-BAF5-9E4C-8987-3C0F093AB4FB}" type="datetimeFigureOut">
               <a:rPr lang="en-US" smtClean="0"/>
-              <a:t>11/30/20</a:t>
+              <a:t>12/1/20</a:t>
             </a:fld>
             <a:endParaRPr lang="en-US"/>
           </a:p>
@@ -2246,7 +2336,7 @@
           <a:p>
             <a:fld id="{C76C56C1-BAF5-9E4C-8987-3C0F093AB4FB}" type="datetimeFigureOut">
               <a:rPr lang="en-US" smtClean="0"/>
-              <a:t>11/30/20</a:t>
+              <a:t>12/1/20</a:t>
             </a:fld>
             <a:endParaRPr lang="en-US"/>
           </a:p>
@@ -2387,7 +2477,7 @@
           <a:p>
             <a:fld id="{C76C56C1-BAF5-9E4C-8987-3C0F093AB4FB}" type="datetimeFigureOut">
               <a:rPr lang="en-US" smtClean="0"/>
-              <a:t>11/30/20</a:t>
+              <a:t>12/1/20</a:t>
             </a:fld>
             <a:endParaRPr lang="en-US"/>
           </a:p>
@@ -2500,7 +2590,7 @@
           <a:p>
             <a:fld id="{C76C56C1-BAF5-9E4C-8987-3C0F093AB4FB}" type="datetimeFigureOut">
               <a:rPr lang="en-US" smtClean="0"/>
-              <a:t>11/30/20</a:t>
+              <a:t>12/1/20</a:t>
             </a:fld>
             <a:endParaRPr lang="en-US"/>
           </a:p>
@@ -2811,7 +2901,7 @@
           <a:p>
             <a:fld id="{C76C56C1-BAF5-9E4C-8987-3C0F093AB4FB}" type="datetimeFigureOut">
               <a:rPr lang="en-US" smtClean="0"/>
-              <a:t>11/30/20</a:t>
+              <a:t>12/1/20</a:t>
             </a:fld>
             <a:endParaRPr lang="en-US"/>
           </a:p>
@@ -3099,7 +3189,7 @@
           <a:p>
             <a:fld id="{C76C56C1-BAF5-9E4C-8987-3C0F093AB4FB}" type="datetimeFigureOut">
               <a:rPr lang="en-US" smtClean="0"/>
-              <a:t>11/30/20</a:t>
+              <a:t>12/1/20</a:t>
             </a:fld>
             <a:endParaRPr lang="en-US"/>
           </a:p>
@@ -3340,7 +3430,7 @@
           <a:p>
             <a:fld id="{C76C56C1-BAF5-9E4C-8987-3C0F093AB4FB}" type="datetimeFigureOut">
               <a:rPr lang="en-US" smtClean="0"/>
-              <a:t>11/30/20</a:t>
+              <a:t>12/1/20</a:t>
             </a:fld>
             <a:endParaRPr lang="en-US"/>
           </a:p>
@@ -4515,6 +4605,966 @@
     <p:extLst>
       <p:ext uri="{BB962C8B-B14F-4D97-AF65-F5344CB8AC3E}">
         <p14:creationId xmlns:p14="http://schemas.microsoft.com/office/powerpoint/2010/main" val="1560439973"/>
+      </p:ext>
+    </p:extLst>
+  </p:cSld>
+  <p:clrMapOvr>
+    <a:masterClrMapping/>
+  </p:clrMapOvr>
+</p:sld>
+</file>
+
+<file path=ppt/slides/slide2.xml><?xml version="1.0" encoding="utf-8"?>
+<p:sld xmlns:a="http://schemas.openxmlformats.org/drawingml/2006/main" xmlns:r="http://schemas.openxmlformats.org/officeDocument/2006/relationships" xmlns:p="http://schemas.openxmlformats.org/presentationml/2006/main" showMasterSp="0">
+  <p:cSld>
+    <p:bg>
+      <p:bgPr>
+        <a:solidFill>
+          <a:schemeClr val="bg1">
+            <a:lumMod val="85000"/>
+          </a:schemeClr>
+        </a:solidFill>
+        <a:effectLst/>
+      </p:bgPr>
+    </p:bg>
+    <p:spTree>
+      <p:nvGrpSpPr>
+        <p:cNvPr id="1" name=""/>
+        <p:cNvGrpSpPr/>
+        <p:nvPr/>
+      </p:nvGrpSpPr>
+      <p:grpSpPr>
+        <a:xfrm>
+          <a:off x="0" y="0"/>
+          <a:ext cx="0" cy="0"/>
+          <a:chOff x="0" y="0"/>
+          <a:chExt cx="0" cy="0"/>
+        </a:xfrm>
+      </p:grpSpPr>
+      <p:sp>
+        <p:nvSpPr>
+          <p:cNvPr id="33" name="Rounded Rectangle 32">
+            <a:extLst>
+              <a:ext uri="{FF2B5EF4-FFF2-40B4-BE49-F238E27FC236}">
+                <a16:creationId xmlns:a16="http://schemas.microsoft.com/office/drawing/2014/main" id="{C8F2C9E9-A36B-B049-A4F6-2BF34207C3A3}"/>
+              </a:ext>
+            </a:extLst>
+          </p:cNvPr>
+          <p:cNvSpPr/>
+          <p:nvPr/>
+        </p:nvSpPr>
+        <p:spPr>
+          <a:xfrm>
+            <a:off x="123289" y="5224249"/>
+            <a:ext cx="11944475" cy="1489753"/>
+          </a:xfrm>
+          <a:prstGeom prst="roundRect">
+            <a:avLst/>
+          </a:prstGeom>
+          <a:solidFill>
+            <a:schemeClr val="accent1">
+              <a:lumMod val="20000"/>
+              <a:lumOff val="80000"/>
+            </a:schemeClr>
+          </a:solidFill>
+        </p:spPr>
+        <p:style>
+          <a:lnRef idx="2">
+            <a:schemeClr val="dk1"/>
+          </a:lnRef>
+          <a:fillRef idx="1">
+            <a:schemeClr val="lt1"/>
+          </a:fillRef>
+          <a:effectRef idx="0">
+            <a:schemeClr val="dk1"/>
+          </a:effectRef>
+          <a:fontRef idx="minor">
+            <a:schemeClr val="dk1"/>
+          </a:fontRef>
+        </p:style>
+        <p:txBody>
+          <a:bodyPr numCol="4" rtlCol="0" anchor="ctr"/>
+          <a:lstStyle/>
+          <a:p>
+            <a:pPr algn="ctr"/>
+            <a:r>
+              <a:rPr lang="en-US" sz="1600" b="1" u="sng" dirty="0"/>
+              <a:t>TURN Server Compromise</a:t>
+            </a:r>
+          </a:p>
+          <a:p>
+            <a:pPr marL="285750" indent="-285750">
+              <a:buFont typeface="Arial" panose="020B0604020202020204" pitchFamily="34" charset="0"/>
+              <a:buChar char="•"/>
+            </a:pPr>
+            <a:r>
+              <a:rPr lang="en-US" sz="1400" dirty="0"/>
+              <a:t>Noted tendency of “leaked” private TURN servers to appear in open-source code</a:t>
+            </a:r>
+          </a:p>
+          <a:p>
+            <a:pPr marL="285750" indent="-285750">
+              <a:buFont typeface="Arial" panose="020B0604020202020204" pitchFamily="34" charset="0"/>
+              <a:buChar char="•"/>
+            </a:pPr>
+            <a:r>
+              <a:rPr lang="en-US" sz="1400" dirty="0"/>
+              <a:t>Studied information that could be captured by a rogue TURN server</a:t>
+            </a:r>
+          </a:p>
+          <a:p>
+            <a:pPr marL="285750" indent="-285750">
+              <a:buFont typeface="Arial" panose="020B0604020202020204" pitchFamily="34" charset="0"/>
+              <a:buChar char="•"/>
+            </a:pPr>
+            <a:endParaRPr lang="en-US" sz="1600" dirty="0"/>
+          </a:p>
+          <a:p>
+            <a:pPr marL="285750" indent="-285750">
+              <a:buFont typeface="Arial" panose="020B0604020202020204" pitchFamily="34" charset="0"/>
+              <a:buChar char="•"/>
+            </a:pPr>
+            <a:endParaRPr lang="en-US" sz="1600" dirty="0"/>
+          </a:p>
+          <a:p>
+            <a:endParaRPr lang="en-US" dirty="0"/>
+          </a:p>
+          <a:p>
+            <a:pPr marL="285750" indent="-285750">
+              <a:buFont typeface="Arial" panose="020B0604020202020204" pitchFamily="34" charset="0"/>
+              <a:buChar char="•"/>
+            </a:pPr>
+            <a:endParaRPr lang="en-US" dirty="0"/>
+          </a:p>
+          <a:p>
+            <a:pPr marL="285750" indent="-285750">
+              <a:buFont typeface="Arial" panose="020B0604020202020204" pitchFamily="34" charset="0"/>
+              <a:buChar char="•"/>
+            </a:pPr>
+            <a:endParaRPr lang="en-US" dirty="0"/>
+          </a:p>
+          <a:p>
+            <a:pPr marL="285750" indent="-285750">
+              <a:buFont typeface="Arial" panose="020B0604020202020204" pitchFamily="34" charset="0"/>
+              <a:buChar char="•"/>
+            </a:pPr>
+            <a:endParaRPr lang="en-US" dirty="0"/>
+          </a:p>
+          <a:p>
+            <a:pPr marL="285750" indent="-285750">
+              <a:buFont typeface="Arial" panose="020B0604020202020204" pitchFamily="34" charset="0"/>
+              <a:buChar char="•"/>
+            </a:pPr>
+            <a:endParaRPr lang="en-US" dirty="0"/>
+          </a:p>
+          <a:p>
+            <a:pPr marL="285750" indent="-285750">
+              <a:buFont typeface="Arial" panose="020B0604020202020204" pitchFamily="34" charset="0"/>
+              <a:buChar char="•"/>
+            </a:pPr>
+            <a:endParaRPr lang="en-US" dirty="0"/>
+          </a:p>
+          <a:p>
+            <a:pPr marL="285750" indent="-285750">
+              <a:buFont typeface="Arial" panose="020B0604020202020204" pitchFamily="34" charset="0"/>
+              <a:buChar char="•"/>
+            </a:pPr>
+            <a:endParaRPr lang="en-US" dirty="0"/>
+          </a:p>
+          <a:p>
+            <a:pPr marL="285750" indent="-285750">
+              <a:buFont typeface="Arial" panose="020B0604020202020204" pitchFamily="34" charset="0"/>
+              <a:buChar char="•"/>
+            </a:pPr>
+            <a:endParaRPr lang="en-US" dirty="0"/>
+          </a:p>
+          <a:p>
+            <a:pPr algn="ctr"/>
+            <a:r>
+              <a:rPr lang="en-US" sz="1600" b="1" u="sng" dirty="0"/>
+              <a:t>Results</a:t>
+            </a:r>
+          </a:p>
+          <a:p>
+            <a:pPr marL="285750" indent="-285750">
+              <a:buFont typeface="Arial" panose="020B0604020202020204" pitchFamily="34" charset="0"/>
+              <a:buChar char="•"/>
+            </a:pPr>
+            <a:r>
+              <a:rPr lang="en-US" sz="1400" dirty="0"/>
+              <a:t>Traffic passing through server leaks users’ IPs and open ports</a:t>
+            </a:r>
+          </a:p>
+          <a:p>
+            <a:pPr marL="285750" indent="-285750">
+              <a:buFont typeface="Arial" panose="020B0604020202020204" pitchFamily="34" charset="0"/>
+              <a:buChar char="•"/>
+            </a:pPr>
+            <a:r>
+              <a:rPr lang="en-US" sz="1400" dirty="0"/>
+              <a:t>Studying packet size indicates number of users and type of media shared</a:t>
+            </a:r>
+          </a:p>
+        </p:txBody>
+      </p:sp>
+      <p:sp>
+        <p:nvSpPr>
+          <p:cNvPr id="32" name="Rounded Rectangle 31">
+            <a:extLst>
+              <a:ext uri="{FF2B5EF4-FFF2-40B4-BE49-F238E27FC236}">
+                <a16:creationId xmlns:a16="http://schemas.microsoft.com/office/drawing/2014/main" id="{BF1E035C-FC55-3244-8087-5E09E629DDA9}"/>
+              </a:ext>
+            </a:extLst>
+          </p:cNvPr>
+          <p:cNvSpPr/>
+          <p:nvPr/>
+        </p:nvSpPr>
+        <p:spPr>
+          <a:xfrm>
+            <a:off x="123289" y="3809543"/>
+            <a:ext cx="11944475" cy="1350413"/>
+          </a:xfrm>
+          <a:prstGeom prst="roundRect">
+            <a:avLst/>
+          </a:prstGeom>
+          <a:solidFill>
+            <a:schemeClr val="tx2">
+              <a:lumMod val="20000"/>
+              <a:lumOff val="80000"/>
+            </a:schemeClr>
+          </a:solidFill>
+        </p:spPr>
+        <p:style>
+          <a:lnRef idx="2">
+            <a:schemeClr val="dk1"/>
+          </a:lnRef>
+          <a:fillRef idx="1">
+            <a:schemeClr val="lt1"/>
+          </a:fillRef>
+          <a:effectRef idx="0">
+            <a:schemeClr val="dk1"/>
+          </a:effectRef>
+          <a:fontRef idx="minor">
+            <a:schemeClr val="dk1"/>
+          </a:fontRef>
+        </p:style>
+        <p:txBody>
+          <a:bodyPr numCol="4" rtlCol="0" anchor="ctr"/>
+          <a:lstStyle/>
+          <a:p>
+            <a:pPr algn="ctr"/>
+            <a:r>
+              <a:rPr lang="en-US" sz="1600" b="1" u="sng" dirty="0"/>
+              <a:t>Session Termination Attack</a:t>
+            </a:r>
+          </a:p>
+          <a:p>
+            <a:pPr marL="285750" indent="-285750">
+              <a:buFont typeface="Arial" panose="020B0604020202020204" pitchFamily="34" charset="0"/>
+              <a:buChar char="•"/>
+            </a:pPr>
+            <a:r>
+              <a:rPr lang="en-US" sz="1400" dirty="0"/>
+              <a:t>Instantiate calls in pop-up window</a:t>
+            </a:r>
+          </a:p>
+          <a:p>
+            <a:pPr marL="285750" indent="-285750">
+              <a:buFont typeface="Arial" panose="020B0604020202020204" pitchFamily="34" charset="0"/>
+              <a:buChar char="•"/>
+            </a:pPr>
+            <a:r>
+              <a:rPr lang="en-US" sz="1400" dirty="0"/>
+              <a:t>On hang-up, minimize and hide</a:t>
+            </a:r>
+            <a:r>
+              <a:rPr lang="en-US" sz="1600" dirty="0"/>
+              <a:t> </a:t>
+            </a:r>
+            <a:r>
+              <a:rPr lang="en-US" sz="1400" dirty="0"/>
+              <a:t>session window</a:t>
+            </a:r>
+          </a:p>
+          <a:p>
+            <a:endParaRPr lang="en-US" sz="1600" dirty="0"/>
+          </a:p>
+          <a:p>
+            <a:pPr marL="285750" indent="-285750">
+              <a:buFont typeface="Arial" panose="020B0604020202020204" pitchFamily="34" charset="0"/>
+              <a:buChar char="•"/>
+            </a:pPr>
+            <a:endParaRPr lang="en-US" dirty="0"/>
+          </a:p>
+          <a:p>
+            <a:pPr marL="285750" indent="-285750">
+              <a:buFont typeface="Arial" panose="020B0604020202020204" pitchFamily="34" charset="0"/>
+              <a:buChar char="•"/>
+            </a:pPr>
+            <a:endParaRPr lang="en-US" dirty="0"/>
+          </a:p>
+          <a:p>
+            <a:pPr marL="285750" indent="-285750">
+              <a:buFont typeface="Arial" panose="020B0604020202020204" pitchFamily="34" charset="0"/>
+              <a:buChar char="•"/>
+            </a:pPr>
+            <a:endParaRPr lang="en-US" dirty="0"/>
+          </a:p>
+          <a:p>
+            <a:pPr marL="285750" indent="-285750">
+              <a:buFont typeface="Arial" panose="020B0604020202020204" pitchFamily="34" charset="0"/>
+              <a:buChar char="•"/>
+            </a:pPr>
+            <a:endParaRPr lang="en-US" dirty="0"/>
+          </a:p>
+          <a:p>
+            <a:pPr marL="285750" indent="-285750">
+              <a:buFont typeface="Arial" panose="020B0604020202020204" pitchFamily="34" charset="0"/>
+              <a:buChar char="•"/>
+            </a:pPr>
+            <a:endParaRPr lang="en-US" dirty="0"/>
+          </a:p>
+          <a:p>
+            <a:pPr marL="285750" indent="-285750">
+              <a:buFont typeface="Arial" panose="020B0604020202020204" pitchFamily="34" charset="0"/>
+              <a:buChar char="•"/>
+            </a:pPr>
+            <a:endParaRPr lang="en-US" sz="1600" dirty="0"/>
+          </a:p>
+          <a:p>
+            <a:pPr marL="285750" indent="-285750">
+              <a:buFont typeface="Arial" panose="020B0604020202020204" pitchFamily="34" charset="0"/>
+              <a:buChar char="•"/>
+            </a:pPr>
+            <a:endParaRPr lang="en-US" sz="1600" dirty="0"/>
+          </a:p>
+          <a:p>
+            <a:pPr marL="285750" indent="-285750">
+              <a:buFont typeface="Arial" panose="020B0604020202020204" pitchFamily="34" charset="0"/>
+              <a:buChar char="•"/>
+            </a:pPr>
+            <a:endParaRPr lang="en-US" sz="1600" dirty="0"/>
+          </a:p>
+          <a:p>
+            <a:pPr marL="285750" indent="-285750">
+              <a:buFont typeface="Arial" panose="020B0604020202020204" pitchFamily="34" charset="0"/>
+              <a:buChar char="•"/>
+            </a:pPr>
+            <a:endParaRPr lang="en-US" sz="1600" dirty="0"/>
+          </a:p>
+          <a:p>
+            <a:pPr algn="ctr"/>
+            <a:r>
+              <a:rPr lang="en-US" sz="1600" b="1" u="sng" dirty="0"/>
+              <a:t>Results</a:t>
+            </a:r>
+          </a:p>
+          <a:p>
+            <a:pPr marL="285750" indent="-285750">
+              <a:buFont typeface="Arial" panose="020B0604020202020204" pitchFamily="34" charset="0"/>
+              <a:buChar char="•"/>
+            </a:pPr>
+            <a:r>
+              <a:rPr lang="en-US" sz="1400" dirty="0"/>
+              <a:t>Window remains open (though appears closed) </a:t>
+            </a:r>
+          </a:p>
+          <a:p>
+            <a:pPr marL="285750" indent="-285750">
+              <a:buFont typeface="Arial" panose="020B0604020202020204" pitchFamily="34" charset="0"/>
+              <a:buChar char="•"/>
+            </a:pPr>
+            <a:r>
+              <a:rPr lang="en-US" sz="1400" dirty="0"/>
+              <a:t>Other user retains full-access to camera and microphone </a:t>
+            </a:r>
+          </a:p>
+        </p:txBody>
+      </p:sp>
+      <p:sp>
+        <p:nvSpPr>
+          <p:cNvPr id="31" name="Rounded Rectangle 30">
+            <a:extLst>
+              <a:ext uri="{FF2B5EF4-FFF2-40B4-BE49-F238E27FC236}">
+                <a16:creationId xmlns:a16="http://schemas.microsoft.com/office/drawing/2014/main" id="{98305D56-CBAB-7E40-AEC2-EF8F2C2A1A33}"/>
+              </a:ext>
+            </a:extLst>
+          </p:cNvPr>
+          <p:cNvSpPr/>
+          <p:nvPr/>
+        </p:nvSpPr>
+        <p:spPr>
+          <a:xfrm>
+            <a:off x="123289" y="1998643"/>
+            <a:ext cx="11944475" cy="1746607"/>
+          </a:xfrm>
+          <a:prstGeom prst="roundRect">
+            <a:avLst/>
+          </a:prstGeom>
+          <a:solidFill>
+            <a:schemeClr val="accent3">
+              <a:lumMod val="20000"/>
+              <a:lumOff val="80000"/>
+            </a:schemeClr>
+          </a:solidFill>
+        </p:spPr>
+        <p:style>
+          <a:lnRef idx="2">
+            <a:schemeClr val="dk1"/>
+          </a:lnRef>
+          <a:fillRef idx="1">
+            <a:schemeClr val="lt1"/>
+          </a:fillRef>
+          <a:effectRef idx="0">
+            <a:schemeClr val="dk1"/>
+          </a:effectRef>
+          <a:fontRef idx="minor">
+            <a:schemeClr val="dk1"/>
+          </a:fontRef>
+        </p:style>
+        <p:txBody>
+          <a:bodyPr numCol="4" rtlCol="0" anchor="ctr"/>
+          <a:lstStyle/>
+          <a:p>
+            <a:pPr algn="ctr"/>
+            <a:r>
+              <a:rPr lang="en-US" sz="1600" b="1" u="sng" dirty="0" err="1">
+                <a:solidFill>
+                  <a:schemeClr val="tx1"/>
+                </a:solidFill>
+              </a:rPr>
+              <a:t>Signalling</a:t>
+            </a:r>
+            <a:r>
+              <a:rPr lang="en-US" sz="1600" b="1" u="sng" dirty="0">
+                <a:solidFill>
+                  <a:schemeClr val="tx1"/>
+                </a:solidFill>
+              </a:rPr>
+              <a:t> Attack</a:t>
+            </a:r>
+          </a:p>
+          <a:p>
+            <a:pPr marL="285750" indent="-285750">
+              <a:buFont typeface="Arial" panose="020B0604020202020204" pitchFamily="34" charset="0"/>
+              <a:buChar char="•"/>
+            </a:pPr>
+            <a:r>
+              <a:rPr lang="en-US" sz="1400" dirty="0">
+                <a:solidFill>
+                  <a:schemeClr val="tx1"/>
+                </a:solidFill>
+              </a:rPr>
+              <a:t>Created compromised signaling server</a:t>
+            </a:r>
+          </a:p>
+          <a:p>
+            <a:pPr marL="285750" indent="-285750">
+              <a:buFont typeface="Arial" panose="020B0604020202020204" pitchFamily="34" charset="0"/>
+              <a:buChar char="•"/>
+            </a:pPr>
+            <a:r>
+              <a:rPr lang="en-US" sz="1400" dirty="0">
+                <a:solidFill>
+                  <a:schemeClr val="tx1"/>
+                </a:solidFill>
+              </a:rPr>
+              <a:t>Instead of directly connecting peers, connected them to attacker</a:t>
+            </a:r>
+          </a:p>
+          <a:p>
+            <a:endParaRPr lang="en-US" sz="1600" dirty="0">
+              <a:solidFill>
+                <a:schemeClr val="tx1"/>
+              </a:solidFill>
+            </a:endParaRPr>
+          </a:p>
+          <a:p>
+            <a:endParaRPr lang="en-US" sz="1600" dirty="0">
+              <a:solidFill>
+                <a:schemeClr val="tx1"/>
+              </a:solidFill>
+            </a:endParaRPr>
+          </a:p>
+          <a:p>
+            <a:endParaRPr lang="en-US" sz="1600" dirty="0">
+              <a:solidFill>
+                <a:schemeClr val="tx1"/>
+              </a:solidFill>
+            </a:endParaRPr>
+          </a:p>
+          <a:p>
+            <a:pPr marL="285750" indent="-285750">
+              <a:buFont typeface="Arial" panose="020B0604020202020204" pitchFamily="34" charset="0"/>
+              <a:buChar char="•"/>
+            </a:pPr>
+            <a:endParaRPr lang="en-US" dirty="0">
+              <a:solidFill>
+                <a:schemeClr val="tx1"/>
+              </a:solidFill>
+            </a:endParaRPr>
+          </a:p>
+          <a:p>
+            <a:pPr marL="285750" indent="-285750">
+              <a:buFont typeface="Arial" panose="020B0604020202020204" pitchFamily="34" charset="0"/>
+              <a:buChar char="•"/>
+            </a:pPr>
+            <a:endParaRPr lang="en-US" dirty="0">
+              <a:solidFill>
+                <a:schemeClr val="tx1"/>
+              </a:solidFill>
+            </a:endParaRPr>
+          </a:p>
+          <a:p>
+            <a:pPr marL="285750" indent="-285750">
+              <a:buFont typeface="Arial" panose="020B0604020202020204" pitchFamily="34" charset="0"/>
+              <a:buChar char="•"/>
+            </a:pPr>
+            <a:endParaRPr lang="en-US" dirty="0">
+              <a:solidFill>
+                <a:schemeClr val="tx1"/>
+              </a:solidFill>
+            </a:endParaRPr>
+          </a:p>
+          <a:p>
+            <a:pPr marL="285750" indent="-285750">
+              <a:buFont typeface="Arial" panose="020B0604020202020204" pitchFamily="34" charset="0"/>
+              <a:buChar char="•"/>
+            </a:pPr>
+            <a:endParaRPr lang="en-US" dirty="0">
+              <a:solidFill>
+                <a:schemeClr val="tx1"/>
+              </a:solidFill>
+            </a:endParaRPr>
+          </a:p>
+          <a:p>
+            <a:pPr marL="285750" indent="-285750">
+              <a:buFont typeface="Arial" panose="020B0604020202020204" pitchFamily="34" charset="0"/>
+              <a:buChar char="•"/>
+            </a:pPr>
+            <a:endParaRPr lang="en-US" dirty="0">
+              <a:solidFill>
+                <a:schemeClr val="tx1"/>
+              </a:solidFill>
+            </a:endParaRPr>
+          </a:p>
+          <a:p>
+            <a:pPr marL="285750" indent="-285750">
+              <a:buFont typeface="Arial" panose="020B0604020202020204" pitchFamily="34" charset="0"/>
+              <a:buChar char="•"/>
+            </a:pPr>
+            <a:endParaRPr lang="en-US" dirty="0">
+              <a:solidFill>
+                <a:schemeClr val="tx1"/>
+              </a:solidFill>
+            </a:endParaRPr>
+          </a:p>
+          <a:p>
+            <a:pPr marL="285750" indent="-285750">
+              <a:buFont typeface="Arial" panose="020B0604020202020204" pitchFamily="34" charset="0"/>
+              <a:buChar char="•"/>
+            </a:pPr>
+            <a:endParaRPr lang="en-US" dirty="0">
+              <a:solidFill>
+                <a:schemeClr val="tx1"/>
+              </a:solidFill>
+            </a:endParaRPr>
+          </a:p>
+          <a:p>
+            <a:pPr marL="285750" indent="-285750">
+              <a:buFont typeface="Arial" panose="020B0604020202020204" pitchFamily="34" charset="0"/>
+              <a:buChar char="•"/>
+            </a:pPr>
+            <a:endParaRPr lang="en-US" dirty="0">
+              <a:solidFill>
+                <a:schemeClr val="tx1"/>
+              </a:solidFill>
+            </a:endParaRPr>
+          </a:p>
+          <a:p>
+            <a:pPr marL="285750" indent="-285750">
+              <a:buFont typeface="Arial" panose="020B0604020202020204" pitchFamily="34" charset="0"/>
+              <a:buChar char="•"/>
+            </a:pPr>
+            <a:endParaRPr lang="en-US" dirty="0">
+              <a:solidFill>
+                <a:schemeClr val="tx1"/>
+              </a:solidFill>
+            </a:endParaRPr>
+          </a:p>
+          <a:p>
+            <a:pPr marL="285750" indent="-285750">
+              <a:buFont typeface="Arial" panose="020B0604020202020204" pitchFamily="34" charset="0"/>
+              <a:buChar char="•"/>
+            </a:pPr>
+            <a:endParaRPr lang="en-US" dirty="0">
+              <a:solidFill>
+                <a:schemeClr val="tx1"/>
+              </a:solidFill>
+            </a:endParaRPr>
+          </a:p>
+          <a:p>
+            <a:endParaRPr lang="en-US" dirty="0">
+              <a:solidFill>
+                <a:schemeClr val="tx1"/>
+              </a:solidFill>
+            </a:endParaRPr>
+          </a:p>
+          <a:p>
+            <a:pPr algn="ctr"/>
+            <a:r>
+              <a:rPr lang="en-US" sz="1600" b="1" u="sng" dirty="0">
+                <a:solidFill>
+                  <a:schemeClr val="tx1"/>
+                </a:solidFill>
+              </a:rPr>
+              <a:t>Results</a:t>
+            </a:r>
+          </a:p>
+          <a:p>
+            <a:pPr marL="285750" indent="-285750">
+              <a:buFont typeface="Arial" panose="020B0604020202020204" pitchFamily="34" charset="0"/>
+              <a:buChar char="•"/>
+            </a:pPr>
+            <a:r>
+              <a:rPr lang="en-US" sz="1400" dirty="0">
+                <a:solidFill>
+                  <a:schemeClr val="tx1"/>
+                </a:solidFill>
+              </a:rPr>
+              <a:t>Attacker views audio/video streams of users</a:t>
+            </a:r>
+          </a:p>
+          <a:p>
+            <a:pPr marL="285750" indent="-285750">
+              <a:buFont typeface="Arial" panose="020B0604020202020204" pitchFamily="34" charset="0"/>
+              <a:buChar char="•"/>
+            </a:pPr>
+            <a:r>
+              <a:rPr lang="en-US" sz="1400" dirty="0">
+                <a:solidFill>
+                  <a:schemeClr val="tx1"/>
+                </a:solidFill>
+              </a:rPr>
+              <a:t>Users remain unaware of attacker’s presence</a:t>
+            </a:r>
+            <a:endParaRPr lang="en-US" sz="1400" dirty="0"/>
+          </a:p>
+          <a:p>
+            <a:pPr marL="285750" indent="-285750">
+              <a:buFont typeface="Arial" panose="020B0604020202020204" pitchFamily="34" charset="0"/>
+              <a:buChar char="•"/>
+            </a:pPr>
+            <a:endParaRPr lang="en-US" dirty="0"/>
+          </a:p>
+        </p:txBody>
+      </p:sp>
+      <p:sp>
+        <p:nvSpPr>
+          <p:cNvPr id="2" name="Title 1">
+            <a:extLst>
+              <a:ext uri="{FF2B5EF4-FFF2-40B4-BE49-F238E27FC236}">
+                <a16:creationId xmlns:a16="http://schemas.microsoft.com/office/drawing/2014/main" id="{623DF3E6-489C-004D-8837-7DCA32890BEB}"/>
+              </a:ext>
+            </a:extLst>
+          </p:cNvPr>
+          <p:cNvSpPr>
+            <a:spLocks noGrp="1"/>
+          </p:cNvSpPr>
+          <p:nvPr>
+            <p:ph type="title"/>
+          </p:nvPr>
+        </p:nvSpPr>
+        <p:spPr>
+          <a:xfrm>
+            <a:off x="0" y="0"/>
+            <a:ext cx="12192000" cy="750013"/>
+          </a:xfrm>
+          <a:solidFill>
+            <a:schemeClr val="bg1"/>
+          </a:solidFill>
+          <a:ln>
+            <a:solidFill>
+              <a:schemeClr val="tx1"/>
+            </a:solidFill>
+          </a:ln>
+        </p:spPr>
+        <p:txBody>
+          <a:bodyPr>
+            <a:normAutofit fontScale="90000"/>
+          </a:bodyPr>
+          <a:lstStyle/>
+          <a:p>
+            <a:pPr algn="ctr"/>
+            <a:r>
+              <a:rPr lang="en-US" sz="3200" b="1" dirty="0"/>
+              <a:t>H</a:t>
+            </a:r>
+            <a:r>
+              <a:rPr lang="en-US" sz="3100" b="1" dirty="0"/>
+              <a:t>acking WebRTC: An Analysis of Videoconferencing Vulnerabilities</a:t>
+            </a:r>
+            <a:br>
+              <a:rPr lang="en-US" sz="4000" dirty="0"/>
+            </a:br>
+            <a:r>
+              <a:rPr lang="en-US" sz="2000" dirty="0"/>
+              <a:t>Apollo Lo, Wiley Hunt</a:t>
+            </a:r>
+          </a:p>
+        </p:txBody>
+      </p:sp>
+      <p:sp>
+        <p:nvSpPr>
+          <p:cNvPr id="34" name="Rounded Rectangle 33">
+            <a:extLst>
+              <a:ext uri="{FF2B5EF4-FFF2-40B4-BE49-F238E27FC236}">
+                <a16:creationId xmlns:a16="http://schemas.microsoft.com/office/drawing/2014/main" id="{6D3F05AE-B009-244D-903F-676763D3AFFF}"/>
+              </a:ext>
+            </a:extLst>
+          </p:cNvPr>
+          <p:cNvSpPr/>
+          <p:nvPr/>
+        </p:nvSpPr>
+        <p:spPr>
+          <a:xfrm>
+            <a:off x="123289" y="873000"/>
+            <a:ext cx="3688423" cy="902721"/>
+          </a:xfrm>
+          <a:prstGeom prst="roundRect">
+            <a:avLst/>
+          </a:prstGeom>
+        </p:spPr>
+        <p:style>
+          <a:lnRef idx="2">
+            <a:schemeClr val="dk1"/>
+          </a:lnRef>
+          <a:fillRef idx="1">
+            <a:schemeClr val="lt1"/>
+          </a:fillRef>
+          <a:effectRef idx="0">
+            <a:schemeClr val="dk1"/>
+          </a:effectRef>
+          <a:fontRef idx="minor">
+            <a:schemeClr val="dk1"/>
+          </a:fontRef>
+        </p:style>
+        <p:txBody>
+          <a:bodyPr rtlCol="0" anchor="ctr"/>
+          <a:lstStyle/>
+          <a:p>
+            <a:pPr algn="ctr"/>
+            <a:r>
+              <a:rPr lang="en-US" sz="1200" b="1" dirty="0"/>
+              <a:t>Background</a:t>
+            </a:r>
+          </a:p>
+          <a:p>
+            <a:pPr marL="285750" indent="-285750">
+              <a:buFont typeface="Arial" panose="020B0604020202020204" pitchFamily="34" charset="0"/>
+              <a:buChar char="•"/>
+            </a:pPr>
+            <a:r>
+              <a:rPr lang="en-US" sz="1200" dirty="0"/>
+              <a:t>WebRTC is used for multiple video-conferencing solutions (e.g. Google Hangouts)</a:t>
+            </a:r>
+          </a:p>
+          <a:p>
+            <a:pPr marL="285750" indent="-285750">
+              <a:buFont typeface="Arial" panose="020B0604020202020204" pitchFamily="34" charset="0"/>
+              <a:buChar char="•"/>
+            </a:pPr>
+            <a:r>
+              <a:rPr lang="en-US" sz="1200" dirty="0"/>
+              <a:t>Automatically enabled in many browsers</a:t>
+            </a:r>
+          </a:p>
+        </p:txBody>
+      </p:sp>
+      <p:sp>
+        <p:nvSpPr>
+          <p:cNvPr id="37" name="Rounded Rectangle 36">
+            <a:extLst>
+              <a:ext uri="{FF2B5EF4-FFF2-40B4-BE49-F238E27FC236}">
+                <a16:creationId xmlns:a16="http://schemas.microsoft.com/office/drawing/2014/main" id="{C1082FBE-955C-284B-BAAF-C3C5CCFCD8B5}"/>
+              </a:ext>
+            </a:extLst>
+          </p:cNvPr>
+          <p:cNvSpPr/>
+          <p:nvPr/>
+        </p:nvSpPr>
+        <p:spPr>
+          <a:xfrm>
+            <a:off x="4251788" y="878760"/>
+            <a:ext cx="3688423" cy="902721"/>
+          </a:xfrm>
+          <a:prstGeom prst="roundRect">
+            <a:avLst/>
+          </a:prstGeom>
+        </p:spPr>
+        <p:style>
+          <a:lnRef idx="2">
+            <a:schemeClr val="dk1"/>
+          </a:lnRef>
+          <a:fillRef idx="1">
+            <a:schemeClr val="lt1"/>
+          </a:fillRef>
+          <a:effectRef idx="0">
+            <a:schemeClr val="dk1"/>
+          </a:effectRef>
+          <a:fontRef idx="minor">
+            <a:schemeClr val="dk1"/>
+          </a:fontRef>
+        </p:style>
+        <p:txBody>
+          <a:bodyPr rtlCol="0" anchor="ctr"/>
+          <a:lstStyle/>
+          <a:p>
+            <a:pPr algn="ctr"/>
+            <a:r>
+              <a:rPr lang="en-US" sz="1200" b="1" dirty="0"/>
+              <a:t>Research Questions</a:t>
+            </a:r>
+          </a:p>
+          <a:p>
+            <a:pPr marL="285750" indent="-285750">
+              <a:buFont typeface="Arial" panose="020B0604020202020204" pitchFamily="34" charset="0"/>
+              <a:buChar char="•"/>
+            </a:pPr>
+            <a:r>
+              <a:rPr lang="en-US" sz="1200" dirty="0"/>
+              <a:t>Where is WebRTC vulnerable?</a:t>
+            </a:r>
+          </a:p>
+          <a:p>
+            <a:pPr marL="285750" indent="-285750">
+              <a:buFont typeface="Arial" panose="020B0604020202020204" pitchFamily="34" charset="0"/>
+              <a:buChar char="•"/>
+            </a:pPr>
+            <a:r>
+              <a:rPr lang="en-US" sz="1200" dirty="0"/>
+              <a:t>What sort of attacks could be performed?</a:t>
+            </a:r>
+          </a:p>
+          <a:p>
+            <a:pPr marL="285750" indent="-285750">
+              <a:buFont typeface="Arial" panose="020B0604020202020204" pitchFamily="34" charset="0"/>
+              <a:buChar char="•"/>
+            </a:pPr>
+            <a:r>
+              <a:rPr lang="en-US" sz="1200" dirty="0"/>
+              <a:t>What information could these attacks leak?</a:t>
+            </a:r>
+            <a:endParaRPr lang="en-US" sz="1400" dirty="0"/>
+          </a:p>
+        </p:txBody>
+      </p:sp>
+      <p:sp>
+        <p:nvSpPr>
+          <p:cNvPr id="38" name="Rounded Rectangle 37">
+            <a:extLst>
+              <a:ext uri="{FF2B5EF4-FFF2-40B4-BE49-F238E27FC236}">
+                <a16:creationId xmlns:a16="http://schemas.microsoft.com/office/drawing/2014/main" id="{3E679D60-2887-954A-9FF5-84ECD887DDA9}"/>
+              </a:ext>
+            </a:extLst>
+          </p:cNvPr>
+          <p:cNvSpPr/>
+          <p:nvPr/>
+        </p:nvSpPr>
+        <p:spPr>
+          <a:xfrm>
+            <a:off x="8258709" y="873000"/>
+            <a:ext cx="3688423" cy="902721"/>
+          </a:xfrm>
+          <a:prstGeom prst="roundRect">
+            <a:avLst/>
+          </a:prstGeom>
+        </p:spPr>
+        <p:style>
+          <a:lnRef idx="2">
+            <a:schemeClr val="dk1"/>
+          </a:lnRef>
+          <a:fillRef idx="1">
+            <a:schemeClr val="lt1"/>
+          </a:fillRef>
+          <a:effectRef idx="0">
+            <a:schemeClr val="dk1"/>
+          </a:effectRef>
+          <a:fontRef idx="minor">
+            <a:schemeClr val="dk1"/>
+          </a:fontRef>
+        </p:style>
+        <p:txBody>
+          <a:bodyPr rtlCol="0" anchor="ctr"/>
+          <a:lstStyle/>
+          <a:p>
+            <a:pPr algn="ctr"/>
+            <a:r>
+              <a:rPr lang="en-US" sz="1200" b="1" dirty="0"/>
+              <a:t>Conclusions</a:t>
+            </a:r>
+          </a:p>
+          <a:p>
+            <a:pPr marL="285750" indent="-285750">
+              <a:buFont typeface="Arial" panose="020B0604020202020204" pitchFamily="34" charset="0"/>
+              <a:buChar char="•"/>
+            </a:pPr>
+            <a:r>
+              <a:rPr lang="en-US" sz="1200" dirty="0" err="1"/>
+              <a:t>Vulns</a:t>
+            </a:r>
+            <a:r>
+              <a:rPr lang="en-US" sz="1200" dirty="0"/>
+              <a:t> across the signaling, media, and session initiation/termination layers</a:t>
+            </a:r>
+          </a:p>
+          <a:p>
+            <a:pPr marL="285750" indent="-285750">
+              <a:buFont typeface="Arial" panose="020B0604020202020204" pitchFamily="34" charset="0"/>
+              <a:buChar char="•"/>
+            </a:pPr>
+            <a:r>
+              <a:rPr lang="en-US" sz="1200" dirty="0"/>
+              <a:t>Exploitations can compromise user privacy and reveal information such as IP addresses</a:t>
+            </a:r>
+          </a:p>
+        </p:txBody>
+      </p:sp>
+      <p:pic>
+        <p:nvPicPr>
+          <p:cNvPr id="12" name="Picture 11">
+            <a:extLst>
+              <a:ext uri="{FF2B5EF4-FFF2-40B4-BE49-F238E27FC236}">
+                <a16:creationId xmlns:a16="http://schemas.microsoft.com/office/drawing/2014/main" id="{92AD746D-B26D-F84E-8461-9BEE19E6A43F}"/>
+              </a:ext>
+            </a:extLst>
+          </p:cNvPr>
+          <p:cNvPicPr>
+            <a:picLocks noChangeAspect="1"/>
+          </p:cNvPicPr>
+          <p:nvPr/>
+        </p:nvPicPr>
+        <p:blipFill rotWithShape="1">
+          <a:blip r:embed="rId3">
+            <a:alphaModFix amt="80000"/>
+          </a:blip>
+          <a:srcRect l="12536" r="7493" b="3841"/>
+          <a:stretch/>
+        </p:blipFill>
+        <p:spPr>
+          <a:xfrm>
+            <a:off x="3811712" y="2317641"/>
+            <a:ext cx="4875088" cy="4396361"/>
+          </a:xfrm>
+          <a:prstGeom prst="rect">
+            <a:avLst/>
+          </a:prstGeom>
+        </p:spPr>
+      </p:pic>
+    </p:spTree>
+    <p:extLst>
+      <p:ext uri="{BB962C8B-B14F-4D97-AF65-F5344CB8AC3E}">
+        <p14:creationId xmlns:p14="http://schemas.microsoft.com/office/powerpoint/2010/main" val="2553913166"/>
       </p:ext>
     </p:extLst>
   </p:cSld>

</xml_diff>

<commit_message>
First Cut at updating conclusions section. Needs work...
</commit_message>
<xml_diff>
--- a/WEBRTC_Slide.pptx
+++ b/WEBRTC_Slide.pptx
@@ -8,9 +8,9 @@
     <p:notesMasterId r:id="rId6"/>
   </p:notesMasterIdLst>
   <p:sldIdLst>
-    <p:sldId id="258" r:id="rId2"/>
-    <p:sldId id="260" r:id="rId3"/>
-    <p:sldId id="262" r:id="rId4"/>
+    <p:sldId id="262" r:id="rId2"/>
+    <p:sldId id="258" r:id="rId3"/>
+    <p:sldId id="260" r:id="rId4"/>
     <p:sldId id="261" r:id="rId5"/>
   </p:sldIdLst>
   <p:sldSz cx="12192000" cy="6858000"/>
@@ -200,7 +200,7 @@
           <a:p>
             <a:fld id="{712FDD25-0D0D-E545-910A-0E0EB599F49F}" type="datetimeFigureOut">
               <a:rPr lang="en-US" smtClean="0"/>
-              <a:t>12/3/2020</a:t>
+              <a:t>12/4/20</a:t>
             </a:fld>
             <a:endParaRPr lang="en-US"/>
           </a:p>
@@ -541,7 +541,7 @@
     </p:spTree>
     <p:extLst>
       <p:ext uri="{BB962C8B-B14F-4D97-AF65-F5344CB8AC3E}">
-        <p14:creationId xmlns:p14="http://schemas.microsoft.com/office/powerpoint/2010/main" val="867863539"/>
+        <p14:creationId xmlns:p14="http://schemas.microsoft.com/office/powerpoint/2010/main" val="2321145927"/>
       </p:ext>
     </p:extLst>
   </p:cSld>
@@ -625,7 +625,7 @@
     </p:spTree>
     <p:extLst>
       <p:ext uri="{BB962C8B-B14F-4D97-AF65-F5344CB8AC3E}">
-        <p14:creationId xmlns:p14="http://schemas.microsoft.com/office/powerpoint/2010/main" val="2972221638"/>
+        <p14:creationId xmlns:p14="http://schemas.microsoft.com/office/powerpoint/2010/main" val="867863539"/>
       </p:ext>
     </p:extLst>
   </p:cSld>
@@ -709,7 +709,7 @@
     </p:spTree>
     <p:extLst>
       <p:ext uri="{BB962C8B-B14F-4D97-AF65-F5344CB8AC3E}">
-        <p14:creationId xmlns:p14="http://schemas.microsoft.com/office/powerpoint/2010/main" val="2321145927"/>
+        <p14:creationId xmlns:p14="http://schemas.microsoft.com/office/powerpoint/2010/main" val="2972221638"/>
       </p:ext>
     </p:extLst>
   </p:cSld>
@@ -950,7 +950,7 @@
           <a:p>
             <a:fld id="{C76C56C1-BAF5-9E4C-8987-3C0F093AB4FB}" type="datetimeFigureOut">
               <a:rPr lang="en-US" smtClean="0"/>
-              <a:t>12/3/2020</a:t>
+              <a:t>12/4/20</a:t>
             </a:fld>
             <a:endParaRPr lang="en-US"/>
           </a:p>
@@ -1148,7 +1148,7 @@
           <a:p>
             <a:fld id="{C76C56C1-BAF5-9E4C-8987-3C0F093AB4FB}" type="datetimeFigureOut">
               <a:rPr lang="en-US" smtClean="0"/>
-              <a:t>12/3/2020</a:t>
+              <a:t>12/4/20</a:t>
             </a:fld>
             <a:endParaRPr lang="en-US"/>
           </a:p>
@@ -1356,7 +1356,7 @@
           <a:p>
             <a:fld id="{C76C56C1-BAF5-9E4C-8987-3C0F093AB4FB}" type="datetimeFigureOut">
               <a:rPr lang="en-US" smtClean="0"/>
-              <a:t>12/3/2020</a:t>
+              <a:t>12/4/20</a:t>
             </a:fld>
             <a:endParaRPr lang="en-US"/>
           </a:p>
@@ -1554,7 +1554,7 @@
           <a:p>
             <a:fld id="{C76C56C1-BAF5-9E4C-8987-3C0F093AB4FB}" type="datetimeFigureOut">
               <a:rPr lang="en-US" smtClean="0"/>
-              <a:t>12/3/2020</a:t>
+              <a:t>12/4/20</a:t>
             </a:fld>
             <a:endParaRPr lang="en-US"/>
           </a:p>
@@ -1829,7 +1829,7 @@
           <a:p>
             <a:fld id="{C76C56C1-BAF5-9E4C-8987-3C0F093AB4FB}" type="datetimeFigureOut">
               <a:rPr lang="en-US" smtClean="0"/>
-              <a:t>12/3/2020</a:t>
+              <a:t>12/4/20</a:t>
             </a:fld>
             <a:endParaRPr lang="en-US"/>
           </a:p>
@@ -2094,7 +2094,7 @@
           <a:p>
             <a:fld id="{C76C56C1-BAF5-9E4C-8987-3C0F093AB4FB}" type="datetimeFigureOut">
               <a:rPr lang="en-US" smtClean="0"/>
-              <a:t>12/3/2020</a:t>
+              <a:t>12/4/20</a:t>
             </a:fld>
             <a:endParaRPr lang="en-US"/>
           </a:p>
@@ -2506,7 +2506,7 @@
           <a:p>
             <a:fld id="{C76C56C1-BAF5-9E4C-8987-3C0F093AB4FB}" type="datetimeFigureOut">
               <a:rPr lang="en-US" smtClean="0"/>
-              <a:t>12/3/2020</a:t>
+              <a:t>12/4/20</a:t>
             </a:fld>
             <a:endParaRPr lang="en-US"/>
           </a:p>
@@ -2647,7 +2647,7 @@
           <a:p>
             <a:fld id="{C76C56C1-BAF5-9E4C-8987-3C0F093AB4FB}" type="datetimeFigureOut">
               <a:rPr lang="en-US" smtClean="0"/>
-              <a:t>12/3/2020</a:t>
+              <a:t>12/4/20</a:t>
             </a:fld>
             <a:endParaRPr lang="en-US"/>
           </a:p>
@@ -2760,7 +2760,7 @@
           <a:p>
             <a:fld id="{C76C56C1-BAF5-9E4C-8987-3C0F093AB4FB}" type="datetimeFigureOut">
               <a:rPr lang="en-US" smtClean="0"/>
-              <a:t>12/3/2020</a:t>
+              <a:t>12/4/20</a:t>
             </a:fld>
             <a:endParaRPr lang="en-US"/>
           </a:p>
@@ -3071,7 +3071,7 @@
           <a:p>
             <a:fld id="{C76C56C1-BAF5-9E4C-8987-3C0F093AB4FB}" type="datetimeFigureOut">
               <a:rPr lang="en-US" smtClean="0"/>
-              <a:t>12/3/2020</a:t>
+              <a:t>12/4/20</a:t>
             </a:fld>
             <a:endParaRPr lang="en-US"/>
           </a:p>
@@ -3359,7 +3359,7 @@
           <a:p>
             <a:fld id="{C76C56C1-BAF5-9E4C-8987-3C0F093AB4FB}" type="datetimeFigureOut">
               <a:rPr lang="en-US" smtClean="0"/>
-              <a:t>12/3/2020</a:t>
+              <a:t>12/4/20</a:t>
             </a:fld>
             <a:endParaRPr lang="en-US"/>
           </a:p>
@@ -3600,7 +3600,7 @@
           <a:p>
             <a:fld id="{C76C56C1-BAF5-9E4C-8987-3C0F093AB4FB}" type="datetimeFigureOut">
               <a:rPr lang="en-US" smtClean="0"/>
-              <a:t>12/3/2020</a:t>
+              <a:t>12/4/20</a:t>
             </a:fld>
             <a:endParaRPr lang="en-US"/>
           </a:p>
@@ -4001,801 +4001,6 @@
 </file>
 
 <file path=ppt/slides/slide1.xml><?xml version="1.0" encoding="utf-8"?>
-<p:sld xmlns:a="http://schemas.openxmlformats.org/drawingml/2006/main" xmlns:r="http://schemas.openxmlformats.org/officeDocument/2006/relationships" xmlns:p="http://schemas.openxmlformats.org/presentationml/2006/main">
-  <p:cSld>
-    <p:spTree>
-      <p:nvGrpSpPr>
-        <p:cNvPr id="1" name=""/>
-        <p:cNvGrpSpPr/>
-        <p:nvPr/>
-      </p:nvGrpSpPr>
-      <p:grpSpPr>
-        <a:xfrm>
-          <a:off x="0" y="0"/>
-          <a:ext cx="0" cy="0"/>
-          <a:chOff x="0" y="0"/>
-          <a:chExt cx="0" cy="0"/>
-        </a:xfrm>
-      </p:grpSpPr>
-      <p:sp>
-        <p:nvSpPr>
-          <p:cNvPr id="2" name="Title 1">
-            <a:extLst>
-              <a:ext uri="{FF2B5EF4-FFF2-40B4-BE49-F238E27FC236}">
-                <a16:creationId xmlns:a16="http://schemas.microsoft.com/office/drawing/2014/main" id="{623DF3E6-489C-004D-8837-7DCA32890BEB}"/>
-              </a:ext>
-            </a:extLst>
-          </p:cNvPr>
-          <p:cNvSpPr>
-            <a:spLocks noGrp="1"/>
-          </p:cNvSpPr>
-          <p:nvPr>
-            <p:ph type="title"/>
-          </p:nvPr>
-        </p:nvSpPr>
-        <p:spPr>
-          <a:xfrm>
-            <a:off x="0" y="0"/>
-            <a:ext cx="12192000" cy="750013"/>
-          </a:xfrm>
-          <a:ln>
-            <a:solidFill>
-              <a:schemeClr val="tx1"/>
-            </a:solidFill>
-          </a:ln>
-        </p:spPr>
-        <p:txBody>
-          <a:bodyPr>
-            <a:normAutofit fontScale="90000"/>
-          </a:bodyPr>
-          <a:lstStyle/>
-          <a:p>
-            <a:pPr algn="ctr"/>
-            <a:r>
-              <a:rPr lang="en-US" sz="3200" b="1" dirty="0"/>
-              <a:t>H</a:t>
-            </a:r>
-            <a:r>
-              <a:rPr lang="en-US" sz="3100" b="1" dirty="0"/>
-              <a:t>acking WebRTC: An Analysis of Videoconferencing Vulnerabilities</a:t>
-            </a:r>
-            <a:r>
-              <a:rPr lang="en-US" sz="4000" dirty="0"/>
-              <a:t/>
-            </a:r>
-            <a:br>
-              <a:rPr lang="en-US" sz="4000" dirty="0"/>
-            </a:br>
-            <a:r>
-              <a:rPr lang="en-US" sz="2000" dirty="0"/>
-              <a:t>Apollo Lo, Wiley Hunt</a:t>
-            </a:r>
-          </a:p>
-        </p:txBody>
-      </p:sp>
-      <p:pic>
-        <p:nvPicPr>
-          <p:cNvPr id="8" name="Picture 7">
-            <a:extLst>
-              <a:ext uri="{FF2B5EF4-FFF2-40B4-BE49-F238E27FC236}">
-                <a16:creationId xmlns:a16="http://schemas.microsoft.com/office/drawing/2014/main" id="{77706EB1-8A9D-6846-9F6A-A4F1FEDF231B}"/>
-              </a:ext>
-            </a:extLst>
-          </p:cNvPr>
-          <p:cNvPicPr>
-            <a:picLocks noChangeAspect="1"/>
-          </p:cNvPicPr>
-          <p:nvPr/>
-        </p:nvPicPr>
-        <p:blipFill rotWithShape="1">
-          <a:blip r:embed="rId3"/>
-          <a:srcRect l="14097" r="13232" b="4240"/>
-          <a:stretch/>
-        </p:blipFill>
-        <p:spPr>
-          <a:xfrm>
-            <a:off x="8138078" y="2507325"/>
-            <a:ext cx="3929686" cy="3883632"/>
-          </a:xfrm>
-          <a:prstGeom prst="rect">
-            <a:avLst/>
-          </a:prstGeom>
-        </p:spPr>
-      </p:pic>
-      <p:sp>
-        <p:nvSpPr>
-          <p:cNvPr id="31" name="Rounded Rectangle 30">
-            <a:extLst>
-              <a:ext uri="{FF2B5EF4-FFF2-40B4-BE49-F238E27FC236}">
-                <a16:creationId xmlns:a16="http://schemas.microsoft.com/office/drawing/2014/main" id="{98305D56-CBAB-7E40-AEC2-EF8F2C2A1A33}"/>
-              </a:ext>
-            </a:extLst>
-          </p:cNvPr>
-          <p:cNvSpPr/>
-          <p:nvPr/>
-        </p:nvSpPr>
-        <p:spPr>
-          <a:xfrm>
-            <a:off x="123289" y="1998643"/>
-            <a:ext cx="7421783" cy="1746607"/>
-          </a:xfrm>
-          <a:prstGeom prst="roundRect">
-            <a:avLst/>
-          </a:prstGeom>
-        </p:spPr>
-        <p:style>
-          <a:lnRef idx="2">
-            <a:schemeClr val="dk1"/>
-          </a:lnRef>
-          <a:fillRef idx="1">
-            <a:schemeClr val="lt1"/>
-          </a:fillRef>
-          <a:effectRef idx="0">
-            <a:schemeClr val="dk1"/>
-          </a:effectRef>
-          <a:fontRef idx="minor">
-            <a:schemeClr val="dk1"/>
-          </a:fontRef>
-        </p:style>
-        <p:txBody>
-          <a:bodyPr rtlCol="0" anchor="ctr"/>
-          <a:lstStyle/>
-          <a:p>
-            <a:r>
-              <a:rPr lang="en-US" b="1" dirty="0" err="1"/>
-              <a:t>Signalling</a:t>
-            </a:r>
-            <a:r>
-              <a:rPr lang="en-US" b="1" dirty="0"/>
-              <a:t> Attack</a:t>
-            </a:r>
-          </a:p>
-          <a:p>
-            <a:pPr marL="285750" indent="-285750">
-              <a:buFont typeface="Arial" panose="020B0604020202020204" pitchFamily="34" charset="0"/>
-              <a:buChar char="•"/>
-            </a:pPr>
-            <a:r>
-              <a:rPr lang="en-US" dirty="0"/>
-              <a:t>1</a:t>
-            </a:r>
-          </a:p>
-          <a:p>
-            <a:pPr marL="285750" indent="-285750">
-              <a:buFont typeface="Arial" panose="020B0604020202020204" pitchFamily="34" charset="0"/>
-              <a:buChar char="•"/>
-            </a:pPr>
-            <a:r>
-              <a:rPr lang="en-US" dirty="0"/>
-              <a:t>2</a:t>
-            </a:r>
-          </a:p>
-          <a:p>
-            <a:pPr marL="285750" indent="-285750">
-              <a:buFont typeface="Arial" panose="020B0604020202020204" pitchFamily="34" charset="0"/>
-              <a:buChar char="•"/>
-            </a:pPr>
-            <a:r>
-              <a:rPr lang="en-US" dirty="0"/>
-              <a:t>3</a:t>
-            </a:r>
-          </a:p>
-          <a:p>
-            <a:pPr marL="285750" indent="-285750">
-              <a:buFont typeface="Arial" panose="020B0604020202020204" pitchFamily="34" charset="0"/>
-              <a:buChar char="•"/>
-            </a:pPr>
-            <a:endParaRPr lang="en-US" dirty="0"/>
-          </a:p>
-          <a:p>
-            <a:pPr marL="285750" indent="-285750">
-              <a:buFont typeface="Arial" panose="020B0604020202020204" pitchFamily="34" charset="0"/>
-              <a:buChar char="•"/>
-            </a:pPr>
-            <a:endParaRPr lang="en-US" dirty="0"/>
-          </a:p>
-        </p:txBody>
-      </p:sp>
-      <p:pic>
-        <p:nvPicPr>
-          <p:cNvPr id="13" name="Picture 12">
-            <a:extLst>
-              <a:ext uri="{FF2B5EF4-FFF2-40B4-BE49-F238E27FC236}">
-                <a16:creationId xmlns:a16="http://schemas.microsoft.com/office/drawing/2014/main" id="{CD0F9EE4-BB5F-F148-A361-10173FADA70D}"/>
-              </a:ext>
-            </a:extLst>
-          </p:cNvPr>
-          <p:cNvPicPr>
-            <a:picLocks noChangeAspect="1"/>
-          </p:cNvPicPr>
-          <p:nvPr/>
-        </p:nvPicPr>
-        <p:blipFill>
-          <a:blip r:embed="rId4"/>
-          <a:stretch>
-            <a:fillRect/>
-          </a:stretch>
-        </p:blipFill>
-        <p:spPr>
-          <a:xfrm>
-            <a:off x="4526489" y="2448253"/>
-            <a:ext cx="2813671" cy="1207510"/>
-          </a:xfrm>
-          <a:prstGeom prst="rect">
-            <a:avLst/>
-          </a:prstGeom>
-          <a:solidFill>
-            <a:schemeClr val="bg1"/>
-          </a:solidFill>
-        </p:spPr>
-      </p:pic>
-      <p:sp>
-        <p:nvSpPr>
-          <p:cNvPr id="32" name="Rounded Rectangle 31">
-            <a:extLst>
-              <a:ext uri="{FF2B5EF4-FFF2-40B4-BE49-F238E27FC236}">
-                <a16:creationId xmlns:a16="http://schemas.microsoft.com/office/drawing/2014/main" id="{BF1E035C-FC55-3244-8087-5E09E629DDA9}"/>
-              </a:ext>
-            </a:extLst>
-          </p:cNvPr>
-          <p:cNvSpPr/>
-          <p:nvPr/>
-        </p:nvSpPr>
-        <p:spPr>
-          <a:xfrm>
-            <a:off x="123289" y="3809543"/>
-            <a:ext cx="7421783" cy="1350413"/>
-          </a:xfrm>
-          <a:prstGeom prst="roundRect">
-            <a:avLst/>
-          </a:prstGeom>
-        </p:spPr>
-        <p:style>
-          <a:lnRef idx="2">
-            <a:schemeClr val="dk1"/>
-          </a:lnRef>
-          <a:fillRef idx="1">
-            <a:schemeClr val="lt1"/>
-          </a:fillRef>
-          <a:effectRef idx="0">
-            <a:schemeClr val="dk1"/>
-          </a:effectRef>
-          <a:fontRef idx="minor">
-            <a:schemeClr val="dk1"/>
-          </a:fontRef>
-        </p:style>
-        <p:txBody>
-          <a:bodyPr rtlCol="0" anchor="ctr"/>
-          <a:lstStyle/>
-          <a:p>
-            <a:r>
-              <a:rPr lang="en-US" b="1" dirty="0"/>
-              <a:t>Session Termination Attack</a:t>
-            </a:r>
-          </a:p>
-          <a:p>
-            <a:pPr marL="285750" indent="-285750">
-              <a:buFont typeface="Arial" panose="020B0604020202020204" pitchFamily="34" charset="0"/>
-              <a:buChar char="•"/>
-            </a:pPr>
-            <a:r>
-              <a:rPr lang="en-US" dirty="0"/>
-              <a:t>1</a:t>
-            </a:r>
-          </a:p>
-          <a:p>
-            <a:pPr marL="285750" indent="-285750">
-              <a:buFont typeface="Arial" panose="020B0604020202020204" pitchFamily="34" charset="0"/>
-              <a:buChar char="•"/>
-            </a:pPr>
-            <a:r>
-              <a:rPr lang="en-US" dirty="0"/>
-              <a:t>2</a:t>
-            </a:r>
-          </a:p>
-          <a:p>
-            <a:pPr marL="285750" indent="-285750">
-              <a:buFont typeface="Arial" panose="020B0604020202020204" pitchFamily="34" charset="0"/>
-              <a:buChar char="•"/>
-            </a:pPr>
-            <a:r>
-              <a:rPr lang="en-US" dirty="0"/>
-              <a:t>3</a:t>
-            </a:r>
-          </a:p>
-        </p:txBody>
-      </p:sp>
-      <p:sp>
-        <p:nvSpPr>
-          <p:cNvPr id="33" name="Rounded Rectangle 32">
-            <a:extLst>
-              <a:ext uri="{FF2B5EF4-FFF2-40B4-BE49-F238E27FC236}">
-                <a16:creationId xmlns:a16="http://schemas.microsoft.com/office/drawing/2014/main" id="{C8F2C9E9-A36B-B049-A4F6-2BF34207C3A3}"/>
-              </a:ext>
-            </a:extLst>
-          </p:cNvPr>
-          <p:cNvSpPr/>
-          <p:nvPr/>
-        </p:nvSpPr>
-        <p:spPr>
-          <a:xfrm>
-            <a:off x="123289" y="5224249"/>
-            <a:ext cx="7421783" cy="1489753"/>
-          </a:xfrm>
-          <a:prstGeom prst="roundRect">
-            <a:avLst/>
-          </a:prstGeom>
-        </p:spPr>
-        <p:style>
-          <a:lnRef idx="2">
-            <a:schemeClr val="dk1"/>
-          </a:lnRef>
-          <a:fillRef idx="1">
-            <a:schemeClr val="lt1"/>
-          </a:fillRef>
-          <a:effectRef idx="0">
-            <a:schemeClr val="dk1"/>
-          </a:effectRef>
-          <a:fontRef idx="minor">
-            <a:schemeClr val="dk1"/>
-          </a:fontRef>
-        </p:style>
-        <p:txBody>
-          <a:bodyPr rtlCol="0" anchor="ctr"/>
-          <a:lstStyle/>
-          <a:p>
-            <a:r>
-              <a:rPr lang="en-US" b="1" dirty="0"/>
-              <a:t>TURN Attack</a:t>
-            </a:r>
-          </a:p>
-          <a:p>
-            <a:pPr marL="285750" indent="-285750">
-              <a:buFont typeface="Arial" panose="020B0604020202020204" pitchFamily="34" charset="0"/>
-              <a:buChar char="•"/>
-            </a:pPr>
-            <a:r>
-              <a:rPr lang="en-US" dirty="0"/>
-              <a:t>1</a:t>
-            </a:r>
-          </a:p>
-          <a:p>
-            <a:pPr marL="285750" indent="-285750">
-              <a:buFont typeface="Arial" panose="020B0604020202020204" pitchFamily="34" charset="0"/>
-              <a:buChar char="•"/>
-            </a:pPr>
-            <a:r>
-              <a:rPr lang="en-US" dirty="0"/>
-              <a:t>2</a:t>
-            </a:r>
-          </a:p>
-          <a:p>
-            <a:pPr marL="285750" indent="-285750">
-              <a:buFont typeface="Arial" panose="020B0604020202020204" pitchFamily="34" charset="0"/>
-              <a:buChar char="•"/>
-            </a:pPr>
-            <a:r>
-              <a:rPr lang="en-US" dirty="0"/>
-              <a:t>3</a:t>
-            </a:r>
-          </a:p>
-          <a:p>
-            <a:pPr marL="285750" indent="-285750">
-              <a:buFont typeface="Arial" panose="020B0604020202020204" pitchFamily="34" charset="0"/>
-              <a:buChar char="•"/>
-            </a:pPr>
-            <a:endParaRPr lang="en-US" dirty="0"/>
-          </a:p>
-        </p:txBody>
-      </p:sp>
-      <p:sp>
-        <p:nvSpPr>
-          <p:cNvPr id="34" name="Rounded Rectangle 33">
-            <a:extLst>
-              <a:ext uri="{FF2B5EF4-FFF2-40B4-BE49-F238E27FC236}">
-                <a16:creationId xmlns:a16="http://schemas.microsoft.com/office/drawing/2014/main" id="{6D3F05AE-B009-244D-903F-676763D3AFFF}"/>
-              </a:ext>
-            </a:extLst>
-          </p:cNvPr>
-          <p:cNvSpPr/>
-          <p:nvPr/>
-        </p:nvSpPr>
-        <p:spPr>
-          <a:xfrm>
-            <a:off x="123289" y="873000"/>
-            <a:ext cx="3688423" cy="902721"/>
-          </a:xfrm>
-          <a:prstGeom prst="roundRect">
-            <a:avLst/>
-          </a:prstGeom>
-        </p:spPr>
-        <p:style>
-          <a:lnRef idx="2">
-            <a:schemeClr val="dk1"/>
-          </a:lnRef>
-          <a:fillRef idx="1">
-            <a:schemeClr val="lt1"/>
-          </a:fillRef>
-          <a:effectRef idx="0">
-            <a:schemeClr val="dk1"/>
-          </a:effectRef>
-          <a:fontRef idx="minor">
-            <a:schemeClr val="dk1"/>
-          </a:fontRef>
-        </p:style>
-        <p:txBody>
-          <a:bodyPr rtlCol="0" anchor="ctr"/>
-          <a:lstStyle/>
-          <a:p>
-            <a:pPr algn="ctr"/>
-            <a:r>
-              <a:rPr lang="en-US" sz="1400" b="1" dirty="0"/>
-              <a:t>Background</a:t>
-            </a:r>
-          </a:p>
-          <a:p>
-            <a:pPr marL="285750" indent="-285750">
-              <a:buFont typeface="Arial" panose="020B0604020202020204" pitchFamily="34" charset="0"/>
-              <a:buChar char="•"/>
-            </a:pPr>
-            <a:r>
-              <a:rPr lang="en-US" sz="1400" dirty="0"/>
-              <a:t>WebRTC</a:t>
-            </a:r>
-          </a:p>
-          <a:p>
-            <a:pPr marL="285750" indent="-285750">
-              <a:buFont typeface="Arial" panose="020B0604020202020204" pitchFamily="34" charset="0"/>
-              <a:buChar char="•"/>
-            </a:pPr>
-            <a:r>
-              <a:rPr lang="en-US" sz="1400" dirty="0"/>
-              <a:t>Blah</a:t>
-            </a:r>
-          </a:p>
-          <a:p>
-            <a:pPr marL="285750" indent="-285750">
-              <a:buFont typeface="Arial" panose="020B0604020202020204" pitchFamily="34" charset="0"/>
-              <a:buChar char="•"/>
-            </a:pPr>
-            <a:r>
-              <a:rPr lang="en-US" sz="1400" dirty="0"/>
-              <a:t>Blah</a:t>
-            </a:r>
-          </a:p>
-        </p:txBody>
-      </p:sp>
-      <p:sp>
-        <p:nvSpPr>
-          <p:cNvPr id="37" name="Rounded Rectangle 36">
-            <a:extLst>
-              <a:ext uri="{FF2B5EF4-FFF2-40B4-BE49-F238E27FC236}">
-                <a16:creationId xmlns:a16="http://schemas.microsoft.com/office/drawing/2014/main" id="{C1082FBE-955C-284B-BAAF-C3C5CCFCD8B5}"/>
-              </a:ext>
-            </a:extLst>
-          </p:cNvPr>
-          <p:cNvSpPr/>
-          <p:nvPr/>
-        </p:nvSpPr>
-        <p:spPr>
-          <a:xfrm>
-            <a:off x="4251788" y="878760"/>
-            <a:ext cx="3688423" cy="902721"/>
-          </a:xfrm>
-          <a:prstGeom prst="roundRect">
-            <a:avLst/>
-          </a:prstGeom>
-        </p:spPr>
-        <p:style>
-          <a:lnRef idx="2">
-            <a:schemeClr val="dk1"/>
-          </a:lnRef>
-          <a:fillRef idx="1">
-            <a:schemeClr val="lt1"/>
-          </a:fillRef>
-          <a:effectRef idx="0">
-            <a:schemeClr val="dk1"/>
-          </a:effectRef>
-          <a:fontRef idx="minor">
-            <a:schemeClr val="dk1"/>
-          </a:fontRef>
-        </p:style>
-        <p:txBody>
-          <a:bodyPr rtlCol="0" anchor="ctr"/>
-          <a:lstStyle/>
-          <a:p>
-            <a:pPr algn="ctr"/>
-            <a:r>
-              <a:rPr lang="en-US" sz="1400" b="1" dirty="0"/>
-              <a:t>Research Questions</a:t>
-            </a:r>
-          </a:p>
-          <a:p>
-            <a:pPr marL="285750" indent="-285750">
-              <a:buFont typeface="Arial" panose="020B0604020202020204" pitchFamily="34" charset="0"/>
-              <a:buChar char="•"/>
-            </a:pPr>
-            <a:r>
-              <a:rPr lang="en-US" sz="1400" dirty="0"/>
-              <a:t>WebRTC</a:t>
-            </a:r>
-          </a:p>
-          <a:p>
-            <a:pPr marL="285750" indent="-285750">
-              <a:buFont typeface="Arial" panose="020B0604020202020204" pitchFamily="34" charset="0"/>
-              <a:buChar char="•"/>
-            </a:pPr>
-            <a:r>
-              <a:rPr lang="en-US" sz="1400" dirty="0"/>
-              <a:t>Blah</a:t>
-            </a:r>
-          </a:p>
-          <a:p>
-            <a:pPr marL="285750" indent="-285750">
-              <a:buFont typeface="Arial" panose="020B0604020202020204" pitchFamily="34" charset="0"/>
-              <a:buChar char="•"/>
-            </a:pPr>
-            <a:r>
-              <a:rPr lang="en-US" sz="1400" dirty="0"/>
-              <a:t>Blah</a:t>
-            </a:r>
-            <a:endParaRPr lang="en-US" sz="1600" dirty="0"/>
-          </a:p>
-        </p:txBody>
-      </p:sp>
-      <p:sp>
-        <p:nvSpPr>
-          <p:cNvPr id="38" name="Rounded Rectangle 37">
-            <a:extLst>
-              <a:ext uri="{FF2B5EF4-FFF2-40B4-BE49-F238E27FC236}">
-                <a16:creationId xmlns:a16="http://schemas.microsoft.com/office/drawing/2014/main" id="{3E679D60-2887-954A-9FF5-84ECD887DDA9}"/>
-              </a:ext>
-            </a:extLst>
-          </p:cNvPr>
-          <p:cNvSpPr/>
-          <p:nvPr/>
-        </p:nvSpPr>
-        <p:spPr>
-          <a:xfrm>
-            <a:off x="8258709" y="873000"/>
-            <a:ext cx="3688423" cy="902721"/>
-          </a:xfrm>
-          <a:prstGeom prst="roundRect">
-            <a:avLst/>
-          </a:prstGeom>
-        </p:spPr>
-        <p:style>
-          <a:lnRef idx="2">
-            <a:schemeClr val="dk1"/>
-          </a:lnRef>
-          <a:fillRef idx="1">
-            <a:schemeClr val="lt1"/>
-          </a:fillRef>
-          <a:effectRef idx="0">
-            <a:schemeClr val="dk1"/>
-          </a:effectRef>
-          <a:fontRef idx="minor">
-            <a:schemeClr val="dk1"/>
-          </a:fontRef>
-        </p:style>
-        <p:txBody>
-          <a:bodyPr rtlCol="0" anchor="ctr"/>
-          <a:lstStyle/>
-          <a:p>
-            <a:pPr algn="ctr"/>
-            <a:r>
-              <a:rPr lang="en-US" sz="1400" b="1" dirty="0"/>
-              <a:t>Conclusions</a:t>
-            </a:r>
-          </a:p>
-          <a:p>
-            <a:pPr marL="285750" indent="-285750">
-              <a:buFont typeface="Arial" panose="020B0604020202020204" pitchFamily="34" charset="0"/>
-              <a:buChar char="•"/>
-            </a:pPr>
-            <a:r>
-              <a:rPr lang="en-US" sz="1400" dirty="0"/>
-              <a:t>WebRTC</a:t>
-            </a:r>
-          </a:p>
-          <a:p>
-            <a:pPr marL="285750" indent="-285750">
-              <a:buFont typeface="Arial" panose="020B0604020202020204" pitchFamily="34" charset="0"/>
-              <a:buChar char="•"/>
-            </a:pPr>
-            <a:r>
-              <a:rPr lang="en-US" sz="1400" dirty="0"/>
-              <a:t>Blah</a:t>
-            </a:r>
-          </a:p>
-          <a:p>
-            <a:pPr marL="285750" indent="-285750">
-              <a:buFont typeface="Arial" panose="020B0604020202020204" pitchFamily="34" charset="0"/>
-              <a:buChar char="•"/>
-            </a:pPr>
-            <a:r>
-              <a:rPr lang="en-US" sz="1400" dirty="0"/>
-              <a:t>Blah</a:t>
-            </a:r>
-            <a:endParaRPr lang="en-US" sz="1600" dirty="0"/>
-          </a:p>
-        </p:txBody>
-      </p:sp>
-      <p:pic>
-        <p:nvPicPr>
-          <p:cNvPr id="41" name="Picture 40">
-            <a:extLst>
-              <a:ext uri="{FF2B5EF4-FFF2-40B4-BE49-F238E27FC236}">
-                <a16:creationId xmlns:a16="http://schemas.microsoft.com/office/drawing/2014/main" id="{361DECBB-24AF-7146-B1BB-0304B09B7732}"/>
-              </a:ext>
-            </a:extLst>
-          </p:cNvPr>
-          <p:cNvPicPr>
-            <a:picLocks noChangeAspect="1"/>
-          </p:cNvPicPr>
-          <p:nvPr/>
-        </p:nvPicPr>
-        <p:blipFill rotWithShape="1">
-          <a:blip r:embed="rId5"/>
-          <a:srcRect t="6859" r="3752" b="31049"/>
-          <a:stretch/>
-        </p:blipFill>
-        <p:spPr>
-          <a:xfrm>
-            <a:off x="3696258" y="5329714"/>
-            <a:ext cx="3575407" cy="1278821"/>
-          </a:xfrm>
-          <a:prstGeom prst="rect">
-            <a:avLst/>
-          </a:prstGeom>
-        </p:spPr>
-      </p:pic>
-      <p:cxnSp>
-        <p:nvCxnSpPr>
-          <p:cNvPr id="43" name="Straight Arrow Connector 42">
-            <a:extLst>
-              <a:ext uri="{FF2B5EF4-FFF2-40B4-BE49-F238E27FC236}">
-                <a16:creationId xmlns:a16="http://schemas.microsoft.com/office/drawing/2014/main" id="{182836C6-933C-5A40-9392-310F4AD0C354}"/>
-              </a:ext>
-            </a:extLst>
-          </p:cNvPr>
-          <p:cNvCxnSpPr>
-            <a:stCxn id="31" idx="3"/>
-          </p:cNvCxnSpPr>
-          <p:nvPr/>
-        </p:nvCxnSpPr>
-        <p:spPr>
-          <a:xfrm flipV="1">
-            <a:off x="7545072" y="2712378"/>
-            <a:ext cx="2061265" cy="159569"/>
-          </a:xfrm>
-          <a:prstGeom prst="straightConnector1">
-            <a:avLst/>
-          </a:prstGeom>
-          <a:ln w="28575">
-            <a:tailEnd type="triangle"/>
-          </a:ln>
-        </p:spPr>
-        <p:style>
-          <a:lnRef idx="2">
-            <a:schemeClr val="dk1"/>
-          </a:lnRef>
-          <a:fillRef idx="0">
-            <a:schemeClr val="dk1"/>
-          </a:fillRef>
-          <a:effectRef idx="1">
-            <a:schemeClr val="dk1"/>
-          </a:effectRef>
-          <a:fontRef idx="minor">
-            <a:schemeClr val="tx1"/>
-          </a:fontRef>
-        </p:style>
-      </p:cxnSp>
-      <p:cxnSp>
-        <p:nvCxnSpPr>
-          <p:cNvPr id="44" name="Straight Arrow Connector 43">
-            <a:extLst>
-              <a:ext uri="{FF2B5EF4-FFF2-40B4-BE49-F238E27FC236}">
-                <a16:creationId xmlns:a16="http://schemas.microsoft.com/office/drawing/2014/main" id="{63D89BEB-E3B6-B94C-BC63-0CF984580C75}"/>
-              </a:ext>
-            </a:extLst>
-          </p:cNvPr>
-          <p:cNvCxnSpPr>
-            <a:cxnSpLocks/>
-            <a:stCxn id="32" idx="3"/>
-          </p:cNvCxnSpPr>
-          <p:nvPr/>
-        </p:nvCxnSpPr>
-        <p:spPr>
-          <a:xfrm>
-            <a:off x="7545072" y="4484750"/>
-            <a:ext cx="713637" cy="0"/>
-          </a:xfrm>
-          <a:prstGeom prst="straightConnector1">
-            <a:avLst/>
-          </a:prstGeom>
-          <a:ln w="28575">
-            <a:tailEnd type="triangle"/>
-          </a:ln>
-        </p:spPr>
-        <p:style>
-          <a:lnRef idx="2">
-            <a:schemeClr val="dk1"/>
-          </a:lnRef>
-          <a:fillRef idx="0">
-            <a:schemeClr val="dk1"/>
-          </a:fillRef>
-          <a:effectRef idx="1">
-            <a:schemeClr val="dk1"/>
-          </a:effectRef>
-          <a:fontRef idx="minor">
-            <a:schemeClr val="tx1"/>
-          </a:fontRef>
-        </p:style>
-      </p:cxnSp>
-      <p:cxnSp>
-        <p:nvCxnSpPr>
-          <p:cNvPr id="47" name="Straight Arrow Connector 46">
-            <a:extLst>
-              <a:ext uri="{FF2B5EF4-FFF2-40B4-BE49-F238E27FC236}">
-                <a16:creationId xmlns:a16="http://schemas.microsoft.com/office/drawing/2014/main" id="{9691CB7C-D9E5-1741-8DC4-1748D05D04FB}"/>
-              </a:ext>
-            </a:extLst>
-          </p:cNvPr>
-          <p:cNvCxnSpPr>
-            <a:cxnSpLocks/>
-            <a:stCxn id="33" idx="3"/>
-          </p:cNvCxnSpPr>
-          <p:nvPr/>
-        </p:nvCxnSpPr>
-        <p:spPr>
-          <a:xfrm flipV="1">
-            <a:off x="7545072" y="5899456"/>
-            <a:ext cx="2061265" cy="69670"/>
-          </a:xfrm>
-          <a:prstGeom prst="straightConnector1">
-            <a:avLst/>
-          </a:prstGeom>
-          <a:ln w="28575">
-            <a:tailEnd type="triangle"/>
-          </a:ln>
-        </p:spPr>
-        <p:style>
-          <a:lnRef idx="2">
-            <a:schemeClr val="dk1"/>
-          </a:lnRef>
-          <a:fillRef idx="0">
-            <a:schemeClr val="dk1"/>
-          </a:fillRef>
-          <a:effectRef idx="1">
-            <a:schemeClr val="dk1"/>
-          </a:effectRef>
-          <a:fontRef idx="minor">
-            <a:schemeClr val="tx1"/>
-          </a:fontRef>
-        </p:style>
-      </p:cxnSp>
-    </p:spTree>
-    <p:extLst>
-      <p:ext uri="{BB962C8B-B14F-4D97-AF65-F5344CB8AC3E}">
-        <p14:creationId xmlns:p14="http://schemas.microsoft.com/office/powerpoint/2010/main" val="1560439973"/>
-      </p:ext>
-    </p:extLst>
-  </p:cSld>
-  <p:clrMapOvr>
-    <a:masterClrMapping/>
-  </p:clrMapOvr>
-  <p:timing>
-    <p:tnLst>
-      <p:par>
-        <p:cTn id="1" dur="indefinite" restart="never" nodeType="tmRoot"/>
-      </p:par>
-    </p:tnLst>
-  </p:timing>
-</p:sld>
-</file>
-
-<file path=ppt/slides/slide2.xml><?xml version="1.0" encoding="utf-8"?>
 <p:sld xmlns:a="http://schemas.openxmlformats.org/drawingml/2006/main" xmlns:r="http://schemas.openxmlformats.org/officeDocument/2006/relationships" xmlns:p="http://schemas.openxmlformats.org/presentationml/2006/main" showMasterSp="0">
   <p:cSld>
     <p:bg>
@@ -5036,7 +4241,7 @@
             <a:pPr algn="ctr"/>
             <a:r>
               <a:rPr lang="en-US" sz="1600" b="1" u="sng" dirty="0"/>
-              <a:t>Session Termination Attack</a:t>
+              <a:t>Session Termination Exploit</a:t>
             </a:r>
           </a:p>
           <a:p>
@@ -5046,7 +4251,7 @@
             </a:pPr>
             <a:r>
               <a:rPr lang="en-US" sz="1400" dirty="0"/>
-              <a:t>Instantiate calls in pop-up window</a:t>
+              <a:t>Initiate calls in pop-up window</a:t>
             </a:r>
           </a:p>
           <a:p>
@@ -5056,24 +4261,19 @@
             </a:pPr>
             <a:r>
               <a:rPr lang="en-US" sz="1400" dirty="0"/>
-              <a:t>On hang-up, minimize and </a:t>
-            </a:r>
-            <a:r>
-              <a:rPr lang="en-US" sz="1400" dirty="0" smtClean="0"/>
-              <a:t>hide</a:t>
+              <a:t>On hang-up, minimize and hide</a:t>
             </a:r>
             <a:r>
               <a:rPr lang="en-US" sz="1600" dirty="0"/>
               <a:t> </a:t>
             </a:r>
             <a:r>
-              <a:rPr lang="en-US" sz="1400" dirty="0" smtClean="0"/>
+              <a:rPr lang="en-US" sz="1400" dirty="0"/>
               <a:t>window without terminating media session</a:t>
             </a:r>
-            <a:endParaRPr lang="en-US" sz="1400" dirty="0"/>
-          </a:p>
-          <a:p>
-            <a:endParaRPr lang="en-US" sz="1600" dirty="0" smtClean="0"/>
+          </a:p>
+          <a:p>
+            <a:endParaRPr lang="en-US" sz="1600" dirty="0"/>
           </a:p>
           <a:p>
             <a:endParaRPr lang="en-US" sz="1600" dirty="0"/>
@@ -5176,8 +4376,8 @@
         </p:nvSpPr>
         <p:spPr>
           <a:xfrm>
-            <a:off x="123289" y="1998643"/>
-            <a:ext cx="11944475" cy="1746607"/>
+            <a:off x="123289" y="2435651"/>
+            <a:ext cx="11944475" cy="1309599"/>
           </a:xfrm>
           <a:prstGeom prst="roundRect">
             <a:avLst/>
@@ -5208,21 +4408,21 @@
           <a:lstStyle/>
           <a:p>
             <a:pPr algn="ctr"/>
-            <a:r>
-              <a:rPr lang="en-US" sz="1600" b="1" u="sng" dirty="0" smtClean="0">
-                <a:solidFill>
-                  <a:schemeClr val="tx1"/>
-                </a:solidFill>
-              </a:rPr>
-              <a:t>Signaling </a:t>
-            </a:r>
+            <a:endParaRPr lang="en-US" sz="1600" b="1" u="sng" dirty="0">
+              <a:solidFill>
+                <a:schemeClr val="tx1"/>
+              </a:solidFill>
+            </a:endParaRPr>
+          </a:p>
+          <a:p>
+            <a:pPr algn="ctr"/>
             <a:r>
               <a:rPr lang="en-US" sz="1600" b="1" u="sng" dirty="0">
                 <a:solidFill>
                   <a:schemeClr val="tx1"/>
                 </a:solidFill>
               </a:rPr>
-              <a:t>Attack</a:t>
+              <a:t>Signaling Attack</a:t>
             </a:r>
           </a:p>
           <a:p>
@@ -5252,8 +4452,6 @@
               </a:rPr>
               <a:t>Instead of directly connecting peers, connected them to attacker</a:t>
             </a:r>
-          </a:p>
-          <a:p>
             <a:endParaRPr lang="en-US" sz="1600" dirty="0">
               <a:solidFill>
                 <a:schemeClr val="tx1"/>
@@ -5268,7 +4466,22 @@
             </a:endParaRPr>
           </a:p>
           <a:p>
-            <a:endParaRPr lang="en-US" sz="1600" dirty="0">
+            <a:pPr marL="285750" indent="-285750">
+              <a:buFont typeface="Arial" panose="020B0604020202020204" pitchFamily="34" charset="0"/>
+              <a:buChar char="•"/>
+            </a:pPr>
+            <a:endParaRPr lang="en-US" dirty="0">
+              <a:solidFill>
+                <a:schemeClr val="tx1"/>
+              </a:solidFill>
+            </a:endParaRPr>
+          </a:p>
+          <a:p>
+            <a:pPr marL="285750" indent="-285750">
+              <a:buFont typeface="Arial" panose="020B0604020202020204" pitchFamily="34" charset="0"/>
+              <a:buChar char="•"/>
+            </a:pPr>
+            <a:endParaRPr lang="en-US" dirty="0">
               <a:solidFill>
                 <a:schemeClr val="tx1"/>
               </a:solidFill>
@@ -5413,7 +4626,7 @@
                   <a:schemeClr val="tx1"/>
                 </a:solidFill>
               </a:rPr>
-              <a:t>Attacker views audio/video streams of users</a:t>
+              <a:t>Attacker views users’ media without them knowing</a:t>
             </a:r>
           </a:p>
           <a:p>
@@ -5427,29 +4640,7 @@
                   <a:schemeClr val="tx1"/>
                 </a:solidFill>
               </a:rPr>
-              <a:t>Users remain unaware of attacker’s </a:t>
-            </a:r>
-            <a:r>
-              <a:rPr lang="en-US" sz="1400" dirty="0" smtClean="0">
-                <a:solidFill>
-                  <a:schemeClr val="tx1"/>
-                </a:solidFill>
-              </a:rPr>
-              <a:t>presence</a:t>
-            </a:r>
-          </a:p>
-          <a:p>
-            <a:pPr marL="285750" indent="-285750">
-              <a:buFont typeface="Arial" panose="020B0604020202020204" pitchFamily="34" charset="0"/>
-              <a:buChar char="•"/>
-            </a:pPr>
-            <a:r>
-              <a:rPr lang="en-US" sz="1400" dirty="0" smtClean="0">
-                <a:solidFill>
-                  <a:schemeClr val="tx1"/>
-                </a:solidFill>
-              </a:rPr>
-              <a:t>Attacker can implement video recording</a:t>
+              <a:t>Attacker can implement audio/video recording</a:t>
             </a:r>
             <a:endParaRPr lang="en-US" sz="1400" dirty="0"/>
           </a:p>
@@ -5500,10 +4691,6 @@
               <a:rPr lang="en-US" sz="3100" b="1" dirty="0"/>
               <a:t>acking WebRTC: An Analysis of Videoconferencing Vulnerabilities</a:t>
             </a:r>
-            <a:r>
-              <a:rPr lang="en-US" sz="4000" dirty="0"/>
-              <a:t/>
-            </a:r>
             <a:br>
               <a:rPr lang="en-US" sz="4000" dirty="0"/>
             </a:br>
@@ -5529,7 +4716,7 @@
         <p:spPr>
           <a:xfrm>
             <a:off x="123289" y="873000"/>
-            <a:ext cx="3688423" cy="902721"/>
+            <a:ext cx="5864556" cy="1498358"/>
           </a:xfrm>
           <a:prstGeom prst="roundRect">
             <a:avLst/>
@@ -5550,7 +4737,7 @@
           </a:fontRef>
         </p:style>
         <p:txBody>
-          <a:bodyPr rtlCol="0" anchor="ctr"/>
+          <a:bodyPr numCol="2" rtlCol="0" anchor="ctr"/>
           <a:lstStyle/>
           <a:p>
             <a:pPr algn="ctr"/>
@@ -5566,34 +4753,86 @@
             </a:pPr>
             <a:r>
               <a:rPr lang="en-US" sz="1200" dirty="0"/>
-              <a:t>WebRTC is used for multiple video-conferencing solutions (e.g. Google Hangouts)</a:t>
-            </a:r>
-          </a:p>
-          <a:p>
-            <a:pPr marL="285750" indent="-285750">
-              <a:buFont typeface="Arial" panose="020B0604020202020204" pitchFamily="34" charset="0"/>
-              <a:buChar char="•"/>
-            </a:pPr>
+              <a:t>WebRTC is used by many prominent video-conferencing platforms Google Hangouts, </a:t>
+            </a:r>
+            <a:r>
+              <a:rPr lang="en-US" sz="1200" dirty="0" err="1"/>
+              <a:t>JitsiMeet</a:t>
+            </a:r>
             <a:r>
               <a:rPr lang="en-US" sz="1200" dirty="0"/>
-              <a:t>Automatically enabled in many </a:t>
-            </a:r>
-            <a:r>
-              <a:rPr lang="en-US" sz="1200" dirty="0" smtClean="0"/>
-              <a:t>browsers</a:t>
+              <a:t>, etc.)</a:t>
+            </a:r>
+          </a:p>
+          <a:p>
+            <a:pPr marL="285750" indent="-285750">
+              <a:buFont typeface="Arial" panose="020B0604020202020204" pitchFamily="34" charset="0"/>
+              <a:buChar char="•"/>
+            </a:pPr>
+            <a:r>
+              <a:rPr lang="en-US" sz="1200" dirty="0"/>
+              <a:t>Built-in to most popular browsers (Chrome, Firefox, Safari, etc.)</a:t>
             </a:r>
           </a:p>
           <a:p>
             <a:endParaRPr lang="en-US" sz="1200" dirty="0"/>
           </a:p>
-        </p:txBody>
-      </p:sp>
-      <p:sp>
-        <p:nvSpPr>
-          <p:cNvPr id="37" name="Rounded Rectangle 36">
+          <a:p>
+            <a:pPr algn="ctr"/>
+            <a:r>
+              <a:rPr lang="en-US" sz="1200" b="1" dirty="0"/>
+              <a:t>Focus</a:t>
+            </a:r>
+          </a:p>
+          <a:p>
+            <a:pPr marL="285750" indent="-285750">
+              <a:buFont typeface="Arial" panose="020B0604020202020204" pitchFamily="34" charset="0"/>
+              <a:buChar char="•"/>
+            </a:pPr>
+            <a:r>
+              <a:rPr lang="en-US" sz="1200" dirty="0"/>
+              <a:t>Where is </a:t>
+            </a:r>
+            <a:r>
+              <a:rPr lang="en-US" sz="1200" dirty="0" err="1"/>
+              <a:t>WebRTC</a:t>
+            </a:r>
+            <a:r>
+              <a:rPr lang="en-US" sz="1200" dirty="0"/>
+              <a:t> vulnerable?</a:t>
+            </a:r>
+          </a:p>
+          <a:p>
+            <a:pPr marL="285750" indent="-285750">
+              <a:buFont typeface="Arial" panose="020B0604020202020204" pitchFamily="34" charset="0"/>
+              <a:buChar char="•"/>
+            </a:pPr>
+            <a:r>
+              <a:rPr lang="en-US" sz="1200" dirty="0"/>
+              <a:t>What sort of attacks could be performed?</a:t>
+            </a:r>
+          </a:p>
+          <a:p>
+            <a:pPr marL="285750" indent="-285750">
+              <a:buFont typeface="Arial" panose="020B0604020202020204" pitchFamily="34" charset="0"/>
+              <a:buChar char="•"/>
+            </a:pPr>
+            <a:r>
+              <a:rPr lang="en-US" sz="1200" dirty="0"/>
+              <a:t>What information could these attacks leak?</a:t>
+            </a:r>
+          </a:p>
+          <a:p>
+            <a:endParaRPr lang="en-US" sz="1200" dirty="0"/>
+          </a:p>
+        </p:txBody>
+      </p:sp>
+      <p:sp>
+        <p:nvSpPr>
+          <p:cNvPr id="38" name="Rounded Rectangle 37">
             <a:extLst>
               <a:ext uri="{FF2B5EF4-FFF2-40B4-BE49-F238E27FC236}">
-                <a16:creationId xmlns:a16="http://schemas.microsoft.com/office/drawing/2014/main" id="{C1082FBE-955C-284B-BAAF-C3C5CCFCD8B5}"/>
+                <a16:creationId xmlns:a16="http://schemas.microsoft.com/office/drawing/2014/main" id="{3E679D60-2887-954A-9FF5-84ECD887DDA9}"/>
               </a:ext>
             </a:extLst>
           </p:cNvPr>
@@ -5602,8 +4841,8 @@
         </p:nvSpPr>
         <p:spPr>
           <a:xfrm>
-            <a:off x="4251788" y="878760"/>
-            <a:ext cx="3688423" cy="902721"/>
+            <a:off x="6125498" y="873000"/>
+            <a:ext cx="5939152" cy="1498358"/>
           </a:xfrm>
           <a:prstGeom prst="roundRect">
             <a:avLst/>
@@ -5630,7 +4869,7 @@
             <a:pPr algn="ctr"/>
             <a:r>
               <a:rPr lang="en-US" sz="1200" b="1" dirty="0"/>
-              <a:t>Research Questions</a:t>
+              <a:t>Conclusions</a:t>
             </a:r>
           </a:p>
           <a:p>
@@ -5640,17 +4879,15 @@
             </a:pPr>
             <a:r>
               <a:rPr lang="en-US" sz="1200" dirty="0"/>
-              <a:t>Where is WebRTC vulnerable?</a:t>
-            </a:r>
-          </a:p>
-          <a:p>
-            <a:pPr marL="285750" indent="-285750">
-              <a:buFont typeface="Arial" panose="020B0604020202020204" pitchFamily="34" charset="0"/>
-              <a:buChar char="•"/>
-            </a:pPr>
+              <a:t>Potential </a:t>
+            </a:r>
+            <a:r>
+              <a:rPr lang="en-US" sz="1200" dirty="0" err="1"/>
+              <a:t>vulns</a:t>
+            </a:r>
             <a:r>
               <a:rPr lang="en-US" sz="1200" dirty="0"/>
-              <a:t>What sort of attacks could be performed?</a:t>
+              <a:t> across signaling, media, and session initiation/termination layers</a:t>
             </a:r>
           </a:p>
           <a:p>
@@ -5660,85 +4897,81 @@
             </a:pPr>
             <a:r>
               <a:rPr lang="en-US" sz="1200" dirty="0"/>
-              <a:t>What information could these attacks leak</a:t>
-            </a:r>
-            <a:r>
-              <a:rPr lang="en-US" sz="1200" dirty="0" smtClean="0"/>
-              <a:t>?</a:t>
-            </a:r>
-          </a:p>
-          <a:p>
-            <a:endParaRPr lang="en-US" sz="1400" dirty="0"/>
-          </a:p>
-        </p:txBody>
-      </p:sp>
-      <p:sp>
-        <p:nvSpPr>
-          <p:cNvPr id="38" name="Rounded Rectangle 37">
-            <a:extLst>
-              <a:ext uri="{FF2B5EF4-FFF2-40B4-BE49-F238E27FC236}">
-                <a16:creationId xmlns:a16="http://schemas.microsoft.com/office/drawing/2014/main" id="{3E679D60-2887-954A-9FF5-84ECD887DDA9}"/>
-              </a:ext>
-            </a:extLst>
-          </p:cNvPr>
-          <p:cNvSpPr/>
+              <a:t>Users provide WebRTC services with potentially sensitive information – trust and system integrity is key! </a:t>
+            </a:r>
+          </a:p>
+          <a:p>
+            <a:pPr marL="285750" indent="-285750">
+              <a:buFont typeface="Arial" panose="020B0604020202020204" pitchFamily="34" charset="0"/>
+              <a:buChar char="•"/>
+            </a:pPr>
+            <a:r>
+              <a:rPr lang="en-US" sz="1200" dirty="0"/>
+              <a:t>Installing/using open-source packages/tools can lead to </a:t>
+            </a:r>
+            <a:r>
+              <a:rPr lang="en-US" sz="1200" b="1" dirty="0"/>
+              <a:t>privacy compromise </a:t>
+            </a:r>
+            <a:r>
+              <a:rPr lang="en-US" sz="1200" dirty="0"/>
+              <a:t>(monitoring/recording, IP leaks, continued access to camera/mic)</a:t>
+            </a:r>
+          </a:p>
+          <a:p>
+            <a:pPr marL="285750" indent="-285750">
+              <a:buFont typeface="Arial" panose="020B0604020202020204" pitchFamily="34" charset="0"/>
+              <a:buChar char="•"/>
+            </a:pPr>
+            <a:r>
+              <a:rPr lang="en-US" sz="1200" dirty="0"/>
+              <a:t>Future exploration needed of </a:t>
+            </a:r>
+            <a:r>
+              <a:rPr lang="en-US" sz="1200" dirty="0" err="1"/>
+              <a:t>vulns</a:t>
+            </a:r>
+            <a:r>
+              <a:rPr lang="en-US" sz="1200" dirty="0"/>
+              <a:t> associated with screensharing, chat features</a:t>
+            </a:r>
+            <a:r>
+              <a:rPr lang="en-US" sz="1200"/>
+              <a:t>, etc.</a:t>
+            </a:r>
+            <a:endParaRPr lang="en-US" sz="1200" dirty="0"/>
+          </a:p>
+        </p:txBody>
+      </p:sp>
+      <p:sp>
+        <p:nvSpPr>
+          <p:cNvPr id="59" name="TextBox 58"/>
+          <p:cNvSpPr txBox="1"/>
           <p:nvPr/>
         </p:nvSpPr>
         <p:spPr>
           <a:xfrm>
-            <a:off x="8258709" y="873000"/>
-            <a:ext cx="3688423" cy="902721"/>
-          </a:xfrm>
-          <a:prstGeom prst="roundRect">
+            <a:off x="7010402" y="2949360"/>
+            <a:ext cx="2035277" cy="369332"/>
+          </a:xfrm>
+          <a:prstGeom prst="rect">
             <a:avLst/>
           </a:prstGeom>
-        </p:spPr>
-        <p:style>
-          <a:lnRef idx="2">
-            <a:schemeClr val="dk1"/>
-          </a:lnRef>
-          <a:fillRef idx="1">
-            <a:schemeClr val="lt1"/>
-          </a:fillRef>
-          <a:effectRef idx="0">
-            <a:schemeClr val="dk1"/>
-          </a:effectRef>
-          <a:fontRef idx="minor">
-            <a:schemeClr val="dk1"/>
-          </a:fontRef>
-        </p:style>
-        <p:txBody>
-          <a:bodyPr rtlCol="0" anchor="ctr"/>
-          <a:lstStyle/>
-          <a:p>
-            <a:pPr algn="ctr"/>
-            <a:r>
-              <a:rPr lang="en-US" sz="1200" b="1" dirty="0"/>
-              <a:t>Conclusions</a:t>
-            </a:r>
-          </a:p>
-          <a:p>
-            <a:pPr marL="285750" indent="-285750">
-              <a:buFont typeface="Arial" panose="020B0604020202020204" pitchFamily="34" charset="0"/>
-              <a:buChar char="•"/>
-            </a:pPr>
-            <a:r>
-              <a:rPr lang="en-US" sz="1200" dirty="0" err="1"/>
-              <a:t>Vulns</a:t>
-            </a:r>
-            <a:r>
-              <a:rPr lang="en-US" sz="1200" dirty="0"/>
-              <a:t> across the signaling, media, and session initiation/termination layers</a:t>
-            </a:r>
-          </a:p>
-          <a:p>
-            <a:pPr marL="285750" indent="-285750">
-              <a:buFont typeface="Arial" panose="020B0604020202020204" pitchFamily="34" charset="0"/>
-              <a:buChar char="•"/>
-            </a:pPr>
-            <a:r>
-              <a:rPr lang="en-US" sz="1200" dirty="0"/>
-              <a:t>Exploitations can compromise user privacy and reveal information such as IP addresses</a:t>
+          <a:noFill/>
+        </p:spPr>
+        <p:txBody>
+          <a:bodyPr wrap="square" rtlCol="0">
+            <a:spAutoFit/>
+          </a:bodyPr>
+          <a:lstStyle/>
+          <a:p>
+            <a:r>
+              <a:rPr lang="en-US" b="1" dirty="0" err="1"/>
+              <a:t>WebRTC</a:t>
+            </a:r>
+            <a:r>
+              <a:rPr lang="en-US" b="1" dirty="0"/>
+              <a:t> Signaling</a:t>
             </a:r>
           </a:p>
         </p:txBody>
@@ -5848,8 +5081,8 @@
         </p:blipFill>
         <p:spPr bwMode="auto">
           <a:xfrm>
-            <a:off x="5440849" y="2180452"/>
-            <a:ext cx="1309353" cy="1309353"/>
+            <a:off x="5514029" y="2675462"/>
+            <a:ext cx="1222938" cy="1222938"/>
           </a:xfrm>
           <a:prstGeom prst="rect">
             <a:avLst/>
@@ -5877,8 +5110,8 @@
         </p:nvCxnSpPr>
         <p:spPr>
           <a:xfrm flipV="1">
-            <a:off x="3796052" y="2835129"/>
-            <a:ext cx="1644797" cy="1148699"/>
+            <a:off x="3796052" y="3286931"/>
+            <a:ext cx="1717977" cy="696897"/>
           </a:xfrm>
           <a:prstGeom prst="straightConnector1">
             <a:avLst/>
@@ -5914,8 +5147,8 @@
         </p:nvCxnSpPr>
         <p:spPr>
           <a:xfrm>
-            <a:off x="6750202" y="2835129"/>
-            <a:ext cx="1514335" cy="1148699"/>
+            <a:off x="6736967" y="3286931"/>
+            <a:ext cx="1527570" cy="696897"/>
           </a:xfrm>
           <a:prstGeom prst="straightConnector1">
             <a:avLst/>
@@ -6097,7 +5330,7 @@
         </p:nvSpPr>
         <p:spPr>
           <a:xfrm>
-            <a:off x="5166860" y="1963290"/>
+            <a:off x="5265182" y="2464736"/>
             <a:ext cx="1726867" cy="369332"/>
           </a:xfrm>
           <a:prstGeom prst="rect">
@@ -6113,10 +5346,9 @@
           <a:p>
             <a:pPr algn="ctr"/>
             <a:r>
-              <a:rPr lang="en-US" b="1" dirty="0" smtClean="0"/>
+              <a:rPr lang="en-US" b="1" dirty="0"/>
               <a:t>Signal Server</a:t>
             </a:r>
-            <a:endParaRPr lang="en-US" b="1" dirty="0"/>
           </a:p>
         </p:txBody>
       </p:sp>
@@ -6143,23 +5375,22 @@
           <a:lstStyle/>
           <a:p>
             <a:r>
-              <a:rPr lang="en-US" b="1" dirty="0" smtClean="0"/>
+              <a:rPr lang="en-US" b="1" dirty="0"/>
               <a:t>Media Stream</a:t>
             </a:r>
-            <a:endParaRPr lang="en-US" b="1" dirty="0"/>
-          </a:p>
-        </p:txBody>
-      </p:sp>
-      <p:sp>
-        <p:nvSpPr>
-          <p:cNvPr id="59" name="TextBox 58"/>
+          </a:p>
+        </p:txBody>
+      </p:sp>
+      <p:sp>
+        <p:nvSpPr>
+          <p:cNvPr id="60" name="TextBox 59"/>
           <p:cNvSpPr txBox="1"/>
           <p:nvPr/>
         </p:nvSpPr>
         <p:spPr>
           <a:xfrm>
-            <a:off x="7118555" y="2821540"/>
-            <a:ext cx="2035277" cy="369332"/>
+            <a:off x="5396161" y="6093626"/>
+            <a:ext cx="1396473" cy="369332"/>
           </a:xfrm>
           <a:prstGeom prst="rect">
             <a:avLst/>
@@ -6167,33 +5398,28 @@
           <a:noFill/>
         </p:spPr>
         <p:txBody>
-          <a:bodyPr wrap="square" rtlCol="0">
+          <a:bodyPr wrap="none" rtlCol="0">
             <a:spAutoFit/>
           </a:bodyPr>
           <a:lstStyle/>
           <a:p>
             <a:r>
-              <a:rPr lang="en-US" b="1" dirty="0" err="1" smtClean="0"/>
-              <a:t>WebRTC</a:t>
-            </a:r>
-            <a:r>
-              <a:rPr lang="en-US" b="1" dirty="0" smtClean="0"/>
-              <a:t> Signaling</a:t>
-            </a:r>
-            <a:endParaRPr lang="en-US" b="1" dirty="0"/>
-          </a:p>
-        </p:txBody>
-      </p:sp>
-      <p:sp>
-        <p:nvSpPr>
-          <p:cNvPr id="60" name="TextBox 59"/>
+              <a:rPr lang="en-US" b="1" dirty="0"/>
+              <a:t>TURN Server</a:t>
+            </a:r>
+          </a:p>
+        </p:txBody>
+      </p:sp>
+      <p:sp>
+        <p:nvSpPr>
+          <p:cNvPr id="61" name="TextBox 60"/>
           <p:cNvSpPr txBox="1"/>
           <p:nvPr/>
         </p:nvSpPr>
         <p:spPr>
           <a:xfrm>
-            <a:off x="5396161" y="6093626"/>
-            <a:ext cx="1396473" cy="369332"/>
+            <a:off x="5373335" y="5176526"/>
+            <a:ext cx="1512734" cy="369332"/>
           </a:xfrm>
           <a:prstGeom prst="rect">
             <a:avLst/>
@@ -6201,46 +5427,15 @@
           <a:noFill/>
         </p:spPr>
         <p:txBody>
-          <a:bodyPr wrap="none" rtlCol="0">
-            <a:spAutoFit/>
-          </a:bodyPr>
-          <a:lstStyle/>
-          <a:p>
-            <a:r>
-              <a:rPr lang="en-US" b="1" dirty="0" smtClean="0"/>
-              <a:t>TURN Server</a:t>
-            </a:r>
-            <a:endParaRPr lang="en-US" b="1" dirty="0"/>
-          </a:p>
-        </p:txBody>
-      </p:sp>
-      <p:sp>
-        <p:nvSpPr>
-          <p:cNvPr id="61" name="TextBox 60"/>
-          <p:cNvSpPr txBox="1"/>
-          <p:nvPr/>
-        </p:nvSpPr>
-        <p:spPr>
-          <a:xfrm>
-            <a:off x="5373335" y="5176526"/>
-            <a:ext cx="1512734" cy="369332"/>
-          </a:xfrm>
-          <a:prstGeom prst="rect">
-            <a:avLst/>
-          </a:prstGeom>
-          <a:noFill/>
-        </p:spPr>
-        <p:txBody>
           <a:bodyPr wrap="square" rtlCol="0">
             <a:spAutoFit/>
           </a:bodyPr>
           <a:lstStyle/>
           <a:p>
             <a:r>
-              <a:rPr lang="en-US" b="1" dirty="0" smtClean="0"/>
+              <a:rPr lang="en-US" b="1" dirty="0"/>
               <a:t>Stream Relay</a:t>
             </a:r>
-            <a:endParaRPr lang="en-US" b="1" dirty="0"/>
           </a:p>
         </p:txBody>
       </p:sp>
@@ -6288,25 +5483,802 @@
     </p:spTree>
     <p:extLst>
       <p:ext uri="{BB962C8B-B14F-4D97-AF65-F5344CB8AC3E}">
-        <p14:creationId xmlns:p14="http://schemas.microsoft.com/office/powerpoint/2010/main" val="2553913166"/>
+        <p14:creationId xmlns:p14="http://schemas.microsoft.com/office/powerpoint/2010/main" val="3697997854"/>
       </p:ext>
     </p:extLst>
   </p:cSld>
   <p:clrMapOvr>
     <a:masterClrMapping/>
   </p:clrMapOvr>
-  <p:timing>
-    <p:tnLst>
-      <p:par>
-        <p:cTn id="1" dur="indefinite" restart="never" nodeType="tmRoot"/>
-      </p:par>
-    </p:tnLst>
-  </p:timing>
+</p:sld>
+</file>
+
+<file path=ppt/slides/slide2.xml><?xml version="1.0" encoding="utf-8"?>
+<p:sld xmlns:a="http://schemas.openxmlformats.org/drawingml/2006/main" xmlns:r="http://schemas.openxmlformats.org/officeDocument/2006/relationships" xmlns:p="http://schemas.openxmlformats.org/presentationml/2006/main" show="0">
+  <p:cSld>
+    <p:spTree>
+      <p:nvGrpSpPr>
+        <p:cNvPr id="1" name=""/>
+        <p:cNvGrpSpPr/>
+        <p:nvPr/>
+      </p:nvGrpSpPr>
+      <p:grpSpPr>
+        <a:xfrm>
+          <a:off x="0" y="0"/>
+          <a:ext cx="0" cy="0"/>
+          <a:chOff x="0" y="0"/>
+          <a:chExt cx="0" cy="0"/>
+        </a:xfrm>
+      </p:grpSpPr>
+      <p:sp>
+        <p:nvSpPr>
+          <p:cNvPr id="2" name="Title 1">
+            <a:extLst>
+              <a:ext uri="{FF2B5EF4-FFF2-40B4-BE49-F238E27FC236}">
+                <a16:creationId xmlns:a16="http://schemas.microsoft.com/office/drawing/2014/main" id="{623DF3E6-489C-004D-8837-7DCA32890BEB}"/>
+              </a:ext>
+            </a:extLst>
+          </p:cNvPr>
+          <p:cNvSpPr>
+            <a:spLocks noGrp="1"/>
+          </p:cNvSpPr>
+          <p:nvPr>
+            <p:ph type="title"/>
+          </p:nvPr>
+        </p:nvSpPr>
+        <p:spPr>
+          <a:xfrm>
+            <a:off x="0" y="0"/>
+            <a:ext cx="12192000" cy="750013"/>
+          </a:xfrm>
+          <a:ln>
+            <a:solidFill>
+              <a:schemeClr val="tx1"/>
+            </a:solidFill>
+          </a:ln>
+        </p:spPr>
+        <p:txBody>
+          <a:bodyPr>
+            <a:normAutofit fontScale="90000"/>
+          </a:bodyPr>
+          <a:lstStyle/>
+          <a:p>
+            <a:pPr algn="ctr"/>
+            <a:r>
+              <a:rPr lang="en-US" sz="3200" b="1" dirty="0"/>
+              <a:t>H</a:t>
+            </a:r>
+            <a:r>
+              <a:rPr lang="en-US" sz="3100" b="1" dirty="0"/>
+              <a:t>acking WebRTC: An Analysis of Videoconferencing Vulnerabilities</a:t>
+            </a:r>
+            <a:br>
+              <a:rPr lang="en-US" sz="4000" dirty="0"/>
+            </a:br>
+            <a:r>
+              <a:rPr lang="en-US" sz="2000" dirty="0"/>
+              <a:t>Apollo Lo, Wiley Hunt</a:t>
+            </a:r>
+          </a:p>
+        </p:txBody>
+      </p:sp>
+      <p:pic>
+        <p:nvPicPr>
+          <p:cNvPr id="8" name="Picture 7">
+            <a:extLst>
+              <a:ext uri="{FF2B5EF4-FFF2-40B4-BE49-F238E27FC236}">
+                <a16:creationId xmlns:a16="http://schemas.microsoft.com/office/drawing/2014/main" id="{77706EB1-8A9D-6846-9F6A-A4F1FEDF231B}"/>
+              </a:ext>
+            </a:extLst>
+          </p:cNvPr>
+          <p:cNvPicPr>
+            <a:picLocks noChangeAspect="1"/>
+          </p:cNvPicPr>
+          <p:nvPr/>
+        </p:nvPicPr>
+        <p:blipFill rotWithShape="1">
+          <a:blip r:embed="rId3"/>
+          <a:srcRect l="14097" r="13232" b="4240"/>
+          <a:stretch/>
+        </p:blipFill>
+        <p:spPr>
+          <a:xfrm>
+            <a:off x="8138078" y="2507325"/>
+            <a:ext cx="3929686" cy="3883632"/>
+          </a:xfrm>
+          <a:prstGeom prst="rect">
+            <a:avLst/>
+          </a:prstGeom>
+        </p:spPr>
+      </p:pic>
+      <p:sp>
+        <p:nvSpPr>
+          <p:cNvPr id="31" name="Rounded Rectangle 30">
+            <a:extLst>
+              <a:ext uri="{FF2B5EF4-FFF2-40B4-BE49-F238E27FC236}">
+                <a16:creationId xmlns:a16="http://schemas.microsoft.com/office/drawing/2014/main" id="{98305D56-CBAB-7E40-AEC2-EF8F2C2A1A33}"/>
+              </a:ext>
+            </a:extLst>
+          </p:cNvPr>
+          <p:cNvSpPr/>
+          <p:nvPr/>
+        </p:nvSpPr>
+        <p:spPr>
+          <a:xfrm>
+            <a:off x="123289" y="1998643"/>
+            <a:ext cx="7421783" cy="1746607"/>
+          </a:xfrm>
+          <a:prstGeom prst="roundRect">
+            <a:avLst/>
+          </a:prstGeom>
+        </p:spPr>
+        <p:style>
+          <a:lnRef idx="2">
+            <a:schemeClr val="dk1"/>
+          </a:lnRef>
+          <a:fillRef idx="1">
+            <a:schemeClr val="lt1"/>
+          </a:fillRef>
+          <a:effectRef idx="0">
+            <a:schemeClr val="dk1"/>
+          </a:effectRef>
+          <a:fontRef idx="minor">
+            <a:schemeClr val="dk1"/>
+          </a:fontRef>
+        </p:style>
+        <p:txBody>
+          <a:bodyPr rtlCol="0" anchor="ctr"/>
+          <a:lstStyle/>
+          <a:p>
+            <a:r>
+              <a:rPr lang="en-US" b="1" dirty="0" err="1"/>
+              <a:t>Signalling</a:t>
+            </a:r>
+            <a:r>
+              <a:rPr lang="en-US" b="1" dirty="0"/>
+              <a:t> Attack</a:t>
+            </a:r>
+          </a:p>
+          <a:p>
+            <a:pPr marL="285750" indent="-285750">
+              <a:buFont typeface="Arial" panose="020B0604020202020204" pitchFamily="34" charset="0"/>
+              <a:buChar char="•"/>
+            </a:pPr>
+            <a:r>
+              <a:rPr lang="en-US" dirty="0"/>
+              <a:t>1</a:t>
+            </a:r>
+          </a:p>
+          <a:p>
+            <a:pPr marL="285750" indent="-285750">
+              <a:buFont typeface="Arial" panose="020B0604020202020204" pitchFamily="34" charset="0"/>
+              <a:buChar char="•"/>
+            </a:pPr>
+            <a:r>
+              <a:rPr lang="en-US" dirty="0"/>
+              <a:t>2</a:t>
+            </a:r>
+          </a:p>
+          <a:p>
+            <a:pPr marL="285750" indent="-285750">
+              <a:buFont typeface="Arial" panose="020B0604020202020204" pitchFamily="34" charset="0"/>
+              <a:buChar char="•"/>
+            </a:pPr>
+            <a:r>
+              <a:rPr lang="en-US" dirty="0"/>
+              <a:t>3</a:t>
+            </a:r>
+          </a:p>
+          <a:p>
+            <a:pPr marL="285750" indent="-285750">
+              <a:buFont typeface="Arial" panose="020B0604020202020204" pitchFamily="34" charset="0"/>
+              <a:buChar char="•"/>
+            </a:pPr>
+            <a:endParaRPr lang="en-US" dirty="0"/>
+          </a:p>
+          <a:p>
+            <a:pPr marL="285750" indent="-285750">
+              <a:buFont typeface="Arial" panose="020B0604020202020204" pitchFamily="34" charset="0"/>
+              <a:buChar char="•"/>
+            </a:pPr>
+            <a:endParaRPr lang="en-US" dirty="0"/>
+          </a:p>
+        </p:txBody>
+      </p:sp>
+      <p:pic>
+        <p:nvPicPr>
+          <p:cNvPr id="13" name="Picture 12">
+            <a:extLst>
+              <a:ext uri="{FF2B5EF4-FFF2-40B4-BE49-F238E27FC236}">
+                <a16:creationId xmlns:a16="http://schemas.microsoft.com/office/drawing/2014/main" id="{CD0F9EE4-BB5F-F148-A361-10173FADA70D}"/>
+              </a:ext>
+            </a:extLst>
+          </p:cNvPr>
+          <p:cNvPicPr>
+            <a:picLocks noChangeAspect="1"/>
+          </p:cNvPicPr>
+          <p:nvPr/>
+        </p:nvPicPr>
+        <p:blipFill>
+          <a:blip r:embed="rId4"/>
+          <a:stretch>
+            <a:fillRect/>
+          </a:stretch>
+        </p:blipFill>
+        <p:spPr>
+          <a:xfrm>
+            <a:off x="4526489" y="2448253"/>
+            <a:ext cx="2813671" cy="1207510"/>
+          </a:xfrm>
+          <a:prstGeom prst="rect">
+            <a:avLst/>
+          </a:prstGeom>
+          <a:solidFill>
+            <a:schemeClr val="bg1"/>
+          </a:solidFill>
+        </p:spPr>
+      </p:pic>
+      <p:sp>
+        <p:nvSpPr>
+          <p:cNvPr id="32" name="Rounded Rectangle 31">
+            <a:extLst>
+              <a:ext uri="{FF2B5EF4-FFF2-40B4-BE49-F238E27FC236}">
+                <a16:creationId xmlns:a16="http://schemas.microsoft.com/office/drawing/2014/main" id="{BF1E035C-FC55-3244-8087-5E09E629DDA9}"/>
+              </a:ext>
+            </a:extLst>
+          </p:cNvPr>
+          <p:cNvSpPr/>
+          <p:nvPr/>
+        </p:nvSpPr>
+        <p:spPr>
+          <a:xfrm>
+            <a:off x="123289" y="3809543"/>
+            <a:ext cx="7421783" cy="1350413"/>
+          </a:xfrm>
+          <a:prstGeom prst="roundRect">
+            <a:avLst/>
+          </a:prstGeom>
+        </p:spPr>
+        <p:style>
+          <a:lnRef idx="2">
+            <a:schemeClr val="dk1"/>
+          </a:lnRef>
+          <a:fillRef idx="1">
+            <a:schemeClr val="lt1"/>
+          </a:fillRef>
+          <a:effectRef idx="0">
+            <a:schemeClr val="dk1"/>
+          </a:effectRef>
+          <a:fontRef idx="minor">
+            <a:schemeClr val="dk1"/>
+          </a:fontRef>
+        </p:style>
+        <p:txBody>
+          <a:bodyPr rtlCol="0" anchor="ctr"/>
+          <a:lstStyle/>
+          <a:p>
+            <a:r>
+              <a:rPr lang="en-US" b="1" dirty="0"/>
+              <a:t>Session Termination Attack</a:t>
+            </a:r>
+          </a:p>
+          <a:p>
+            <a:pPr marL="285750" indent="-285750">
+              <a:buFont typeface="Arial" panose="020B0604020202020204" pitchFamily="34" charset="0"/>
+              <a:buChar char="•"/>
+            </a:pPr>
+            <a:r>
+              <a:rPr lang="en-US" dirty="0"/>
+              <a:t>1</a:t>
+            </a:r>
+          </a:p>
+          <a:p>
+            <a:pPr marL="285750" indent="-285750">
+              <a:buFont typeface="Arial" panose="020B0604020202020204" pitchFamily="34" charset="0"/>
+              <a:buChar char="•"/>
+            </a:pPr>
+            <a:r>
+              <a:rPr lang="en-US" dirty="0"/>
+              <a:t>2</a:t>
+            </a:r>
+          </a:p>
+          <a:p>
+            <a:pPr marL="285750" indent="-285750">
+              <a:buFont typeface="Arial" panose="020B0604020202020204" pitchFamily="34" charset="0"/>
+              <a:buChar char="•"/>
+            </a:pPr>
+            <a:r>
+              <a:rPr lang="en-US" dirty="0"/>
+              <a:t>3</a:t>
+            </a:r>
+          </a:p>
+        </p:txBody>
+      </p:sp>
+      <p:sp>
+        <p:nvSpPr>
+          <p:cNvPr id="33" name="Rounded Rectangle 32">
+            <a:extLst>
+              <a:ext uri="{FF2B5EF4-FFF2-40B4-BE49-F238E27FC236}">
+                <a16:creationId xmlns:a16="http://schemas.microsoft.com/office/drawing/2014/main" id="{C8F2C9E9-A36B-B049-A4F6-2BF34207C3A3}"/>
+              </a:ext>
+            </a:extLst>
+          </p:cNvPr>
+          <p:cNvSpPr/>
+          <p:nvPr/>
+        </p:nvSpPr>
+        <p:spPr>
+          <a:xfrm>
+            <a:off x="123289" y="5224249"/>
+            <a:ext cx="7421783" cy="1489753"/>
+          </a:xfrm>
+          <a:prstGeom prst="roundRect">
+            <a:avLst/>
+          </a:prstGeom>
+        </p:spPr>
+        <p:style>
+          <a:lnRef idx="2">
+            <a:schemeClr val="dk1"/>
+          </a:lnRef>
+          <a:fillRef idx="1">
+            <a:schemeClr val="lt1"/>
+          </a:fillRef>
+          <a:effectRef idx="0">
+            <a:schemeClr val="dk1"/>
+          </a:effectRef>
+          <a:fontRef idx="minor">
+            <a:schemeClr val="dk1"/>
+          </a:fontRef>
+        </p:style>
+        <p:txBody>
+          <a:bodyPr rtlCol="0" anchor="ctr"/>
+          <a:lstStyle/>
+          <a:p>
+            <a:r>
+              <a:rPr lang="en-US" b="1" dirty="0"/>
+              <a:t>TURN Attack</a:t>
+            </a:r>
+          </a:p>
+          <a:p>
+            <a:pPr marL="285750" indent="-285750">
+              <a:buFont typeface="Arial" panose="020B0604020202020204" pitchFamily="34" charset="0"/>
+              <a:buChar char="•"/>
+            </a:pPr>
+            <a:r>
+              <a:rPr lang="en-US" dirty="0"/>
+              <a:t>1</a:t>
+            </a:r>
+          </a:p>
+          <a:p>
+            <a:pPr marL="285750" indent="-285750">
+              <a:buFont typeface="Arial" panose="020B0604020202020204" pitchFamily="34" charset="0"/>
+              <a:buChar char="•"/>
+            </a:pPr>
+            <a:r>
+              <a:rPr lang="en-US" dirty="0"/>
+              <a:t>2</a:t>
+            </a:r>
+          </a:p>
+          <a:p>
+            <a:pPr marL="285750" indent="-285750">
+              <a:buFont typeface="Arial" panose="020B0604020202020204" pitchFamily="34" charset="0"/>
+              <a:buChar char="•"/>
+            </a:pPr>
+            <a:r>
+              <a:rPr lang="en-US" dirty="0"/>
+              <a:t>3</a:t>
+            </a:r>
+          </a:p>
+          <a:p>
+            <a:pPr marL="285750" indent="-285750">
+              <a:buFont typeface="Arial" panose="020B0604020202020204" pitchFamily="34" charset="0"/>
+              <a:buChar char="•"/>
+            </a:pPr>
+            <a:endParaRPr lang="en-US" dirty="0"/>
+          </a:p>
+        </p:txBody>
+      </p:sp>
+      <p:sp>
+        <p:nvSpPr>
+          <p:cNvPr id="34" name="Rounded Rectangle 33">
+            <a:extLst>
+              <a:ext uri="{FF2B5EF4-FFF2-40B4-BE49-F238E27FC236}">
+                <a16:creationId xmlns:a16="http://schemas.microsoft.com/office/drawing/2014/main" id="{6D3F05AE-B009-244D-903F-676763D3AFFF}"/>
+              </a:ext>
+            </a:extLst>
+          </p:cNvPr>
+          <p:cNvSpPr/>
+          <p:nvPr/>
+        </p:nvSpPr>
+        <p:spPr>
+          <a:xfrm>
+            <a:off x="123289" y="873000"/>
+            <a:ext cx="3688423" cy="902721"/>
+          </a:xfrm>
+          <a:prstGeom prst="roundRect">
+            <a:avLst/>
+          </a:prstGeom>
+        </p:spPr>
+        <p:style>
+          <a:lnRef idx="2">
+            <a:schemeClr val="dk1"/>
+          </a:lnRef>
+          <a:fillRef idx="1">
+            <a:schemeClr val="lt1"/>
+          </a:fillRef>
+          <a:effectRef idx="0">
+            <a:schemeClr val="dk1"/>
+          </a:effectRef>
+          <a:fontRef idx="minor">
+            <a:schemeClr val="dk1"/>
+          </a:fontRef>
+        </p:style>
+        <p:txBody>
+          <a:bodyPr rtlCol="0" anchor="ctr"/>
+          <a:lstStyle/>
+          <a:p>
+            <a:pPr algn="ctr"/>
+            <a:r>
+              <a:rPr lang="en-US" sz="1400" b="1" dirty="0"/>
+              <a:t>Background</a:t>
+            </a:r>
+          </a:p>
+          <a:p>
+            <a:pPr marL="285750" indent="-285750">
+              <a:buFont typeface="Arial" panose="020B0604020202020204" pitchFamily="34" charset="0"/>
+              <a:buChar char="•"/>
+            </a:pPr>
+            <a:r>
+              <a:rPr lang="en-US" sz="1400" dirty="0"/>
+              <a:t>WebRTC</a:t>
+            </a:r>
+          </a:p>
+          <a:p>
+            <a:pPr marL="285750" indent="-285750">
+              <a:buFont typeface="Arial" panose="020B0604020202020204" pitchFamily="34" charset="0"/>
+              <a:buChar char="•"/>
+            </a:pPr>
+            <a:r>
+              <a:rPr lang="en-US" sz="1400" dirty="0"/>
+              <a:t>Blah</a:t>
+            </a:r>
+          </a:p>
+          <a:p>
+            <a:pPr marL="285750" indent="-285750">
+              <a:buFont typeface="Arial" panose="020B0604020202020204" pitchFamily="34" charset="0"/>
+              <a:buChar char="•"/>
+            </a:pPr>
+            <a:r>
+              <a:rPr lang="en-US" sz="1400" dirty="0"/>
+              <a:t>Blah</a:t>
+            </a:r>
+          </a:p>
+        </p:txBody>
+      </p:sp>
+      <p:sp>
+        <p:nvSpPr>
+          <p:cNvPr id="37" name="Rounded Rectangle 36">
+            <a:extLst>
+              <a:ext uri="{FF2B5EF4-FFF2-40B4-BE49-F238E27FC236}">
+                <a16:creationId xmlns:a16="http://schemas.microsoft.com/office/drawing/2014/main" id="{C1082FBE-955C-284B-BAAF-C3C5CCFCD8B5}"/>
+              </a:ext>
+            </a:extLst>
+          </p:cNvPr>
+          <p:cNvSpPr/>
+          <p:nvPr/>
+        </p:nvSpPr>
+        <p:spPr>
+          <a:xfrm>
+            <a:off x="4251788" y="878760"/>
+            <a:ext cx="3688423" cy="902721"/>
+          </a:xfrm>
+          <a:prstGeom prst="roundRect">
+            <a:avLst/>
+          </a:prstGeom>
+        </p:spPr>
+        <p:style>
+          <a:lnRef idx="2">
+            <a:schemeClr val="dk1"/>
+          </a:lnRef>
+          <a:fillRef idx="1">
+            <a:schemeClr val="lt1"/>
+          </a:fillRef>
+          <a:effectRef idx="0">
+            <a:schemeClr val="dk1"/>
+          </a:effectRef>
+          <a:fontRef idx="minor">
+            <a:schemeClr val="dk1"/>
+          </a:fontRef>
+        </p:style>
+        <p:txBody>
+          <a:bodyPr rtlCol="0" anchor="ctr"/>
+          <a:lstStyle/>
+          <a:p>
+            <a:pPr algn="ctr"/>
+            <a:r>
+              <a:rPr lang="en-US" sz="1400" b="1" dirty="0"/>
+              <a:t>Research Questions</a:t>
+            </a:r>
+          </a:p>
+          <a:p>
+            <a:pPr marL="285750" indent="-285750">
+              <a:buFont typeface="Arial" panose="020B0604020202020204" pitchFamily="34" charset="0"/>
+              <a:buChar char="•"/>
+            </a:pPr>
+            <a:r>
+              <a:rPr lang="en-US" sz="1400" dirty="0"/>
+              <a:t>WebRTC</a:t>
+            </a:r>
+          </a:p>
+          <a:p>
+            <a:pPr marL="285750" indent="-285750">
+              <a:buFont typeface="Arial" panose="020B0604020202020204" pitchFamily="34" charset="0"/>
+              <a:buChar char="•"/>
+            </a:pPr>
+            <a:r>
+              <a:rPr lang="en-US" sz="1400" dirty="0"/>
+              <a:t>Blah</a:t>
+            </a:r>
+          </a:p>
+          <a:p>
+            <a:pPr marL="285750" indent="-285750">
+              <a:buFont typeface="Arial" panose="020B0604020202020204" pitchFamily="34" charset="0"/>
+              <a:buChar char="•"/>
+            </a:pPr>
+            <a:r>
+              <a:rPr lang="en-US" sz="1400" dirty="0"/>
+              <a:t>Blah</a:t>
+            </a:r>
+            <a:endParaRPr lang="en-US" sz="1600" dirty="0"/>
+          </a:p>
+        </p:txBody>
+      </p:sp>
+      <p:sp>
+        <p:nvSpPr>
+          <p:cNvPr id="38" name="Rounded Rectangle 37">
+            <a:extLst>
+              <a:ext uri="{FF2B5EF4-FFF2-40B4-BE49-F238E27FC236}">
+                <a16:creationId xmlns:a16="http://schemas.microsoft.com/office/drawing/2014/main" id="{3E679D60-2887-954A-9FF5-84ECD887DDA9}"/>
+              </a:ext>
+            </a:extLst>
+          </p:cNvPr>
+          <p:cNvSpPr/>
+          <p:nvPr/>
+        </p:nvSpPr>
+        <p:spPr>
+          <a:xfrm>
+            <a:off x="8258709" y="873000"/>
+            <a:ext cx="3688423" cy="902721"/>
+          </a:xfrm>
+          <a:prstGeom prst="roundRect">
+            <a:avLst/>
+          </a:prstGeom>
+        </p:spPr>
+        <p:style>
+          <a:lnRef idx="2">
+            <a:schemeClr val="dk1"/>
+          </a:lnRef>
+          <a:fillRef idx="1">
+            <a:schemeClr val="lt1"/>
+          </a:fillRef>
+          <a:effectRef idx="0">
+            <a:schemeClr val="dk1"/>
+          </a:effectRef>
+          <a:fontRef idx="minor">
+            <a:schemeClr val="dk1"/>
+          </a:fontRef>
+        </p:style>
+        <p:txBody>
+          <a:bodyPr rtlCol="0" anchor="ctr"/>
+          <a:lstStyle/>
+          <a:p>
+            <a:pPr algn="ctr"/>
+            <a:r>
+              <a:rPr lang="en-US" sz="1400" b="1" dirty="0"/>
+              <a:t>Conclusions</a:t>
+            </a:r>
+          </a:p>
+          <a:p>
+            <a:pPr marL="285750" indent="-285750">
+              <a:buFont typeface="Arial" panose="020B0604020202020204" pitchFamily="34" charset="0"/>
+              <a:buChar char="•"/>
+            </a:pPr>
+            <a:r>
+              <a:rPr lang="en-US" sz="1400" dirty="0"/>
+              <a:t>WebRTC</a:t>
+            </a:r>
+          </a:p>
+          <a:p>
+            <a:pPr marL="285750" indent="-285750">
+              <a:buFont typeface="Arial" panose="020B0604020202020204" pitchFamily="34" charset="0"/>
+              <a:buChar char="•"/>
+            </a:pPr>
+            <a:r>
+              <a:rPr lang="en-US" sz="1400" dirty="0"/>
+              <a:t>Blah</a:t>
+            </a:r>
+          </a:p>
+          <a:p>
+            <a:pPr marL="285750" indent="-285750">
+              <a:buFont typeface="Arial" panose="020B0604020202020204" pitchFamily="34" charset="0"/>
+              <a:buChar char="•"/>
+            </a:pPr>
+            <a:r>
+              <a:rPr lang="en-US" sz="1400" dirty="0"/>
+              <a:t>Blah</a:t>
+            </a:r>
+            <a:endParaRPr lang="en-US" sz="1600" dirty="0"/>
+          </a:p>
+        </p:txBody>
+      </p:sp>
+      <p:pic>
+        <p:nvPicPr>
+          <p:cNvPr id="41" name="Picture 40">
+            <a:extLst>
+              <a:ext uri="{FF2B5EF4-FFF2-40B4-BE49-F238E27FC236}">
+                <a16:creationId xmlns:a16="http://schemas.microsoft.com/office/drawing/2014/main" id="{361DECBB-24AF-7146-B1BB-0304B09B7732}"/>
+              </a:ext>
+            </a:extLst>
+          </p:cNvPr>
+          <p:cNvPicPr>
+            <a:picLocks noChangeAspect="1"/>
+          </p:cNvPicPr>
+          <p:nvPr/>
+        </p:nvPicPr>
+        <p:blipFill rotWithShape="1">
+          <a:blip r:embed="rId5"/>
+          <a:srcRect t="6859" r="3752" b="31049"/>
+          <a:stretch/>
+        </p:blipFill>
+        <p:spPr>
+          <a:xfrm>
+            <a:off x="3696258" y="5329714"/>
+            <a:ext cx="3575407" cy="1278821"/>
+          </a:xfrm>
+          <a:prstGeom prst="rect">
+            <a:avLst/>
+          </a:prstGeom>
+        </p:spPr>
+      </p:pic>
+      <p:cxnSp>
+        <p:nvCxnSpPr>
+          <p:cNvPr id="43" name="Straight Arrow Connector 42">
+            <a:extLst>
+              <a:ext uri="{FF2B5EF4-FFF2-40B4-BE49-F238E27FC236}">
+                <a16:creationId xmlns:a16="http://schemas.microsoft.com/office/drawing/2014/main" id="{182836C6-933C-5A40-9392-310F4AD0C354}"/>
+              </a:ext>
+            </a:extLst>
+          </p:cNvPr>
+          <p:cNvCxnSpPr>
+            <a:stCxn id="31" idx="3"/>
+          </p:cNvCxnSpPr>
+          <p:nvPr/>
+        </p:nvCxnSpPr>
+        <p:spPr>
+          <a:xfrm flipV="1">
+            <a:off x="7545072" y="2712378"/>
+            <a:ext cx="2061265" cy="159569"/>
+          </a:xfrm>
+          <a:prstGeom prst="straightConnector1">
+            <a:avLst/>
+          </a:prstGeom>
+          <a:ln w="28575">
+            <a:tailEnd type="triangle"/>
+          </a:ln>
+        </p:spPr>
+        <p:style>
+          <a:lnRef idx="2">
+            <a:schemeClr val="dk1"/>
+          </a:lnRef>
+          <a:fillRef idx="0">
+            <a:schemeClr val="dk1"/>
+          </a:fillRef>
+          <a:effectRef idx="1">
+            <a:schemeClr val="dk1"/>
+          </a:effectRef>
+          <a:fontRef idx="minor">
+            <a:schemeClr val="tx1"/>
+          </a:fontRef>
+        </p:style>
+      </p:cxnSp>
+      <p:cxnSp>
+        <p:nvCxnSpPr>
+          <p:cNvPr id="44" name="Straight Arrow Connector 43">
+            <a:extLst>
+              <a:ext uri="{FF2B5EF4-FFF2-40B4-BE49-F238E27FC236}">
+                <a16:creationId xmlns:a16="http://schemas.microsoft.com/office/drawing/2014/main" id="{63D89BEB-E3B6-B94C-BC63-0CF984580C75}"/>
+              </a:ext>
+            </a:extLst>
+          </p:cNvPr>
+          <p:cNvCxnSpPr>
+            <a:cxnSpLocks/>
+            <a:stCxn id="32" idx="3"/>
+          </p:cNvCxnSpPr>
+          <p:nvPr/>
+        </p:nvCxnSpPr>
+        <p:spPr>
+          <a:xfrm>
+            <a:off x="7545072" y="4484750"/>
+            <a:ext cx="713637" cy="0"/>
+          </a:xfrm>
+          <a:prstGeom prst="straightConnector1">
+            <a:avLst/>
+          </a:prstGeom>
+          <a:ln w="28575">
+            <a:tailEnd type="triangle"/>
+          </a:ln>
+        </p:spPr>
+        <p:style>
+          <a:lnRef idx="2">
+            <a:schemeClr val="dk1"/>
+          </a:lnRef>
+          <a:fillRef idx="0">
+            <a:schemeClr val="dk1"/>
+          </a:fillRef>
+          <a:effectRef idx="1">
+            <a:schemeClr val="dk1"/>
+          </a:effectRef>
+          <a:fontRef idx="minor">
+            <a:schemeClr val="tx1"/>
+          </a:fontRef>
+        </p:style>
+      </p:cxnSp>
+      <p:cxnSp>
+        <p:nvCxnSpPr>
+          <p:cNvPr id="47" name="Straight Arrow Connector 46">
+            <a:extLst>
+              <a:ext uri="{FF2B5EF4-FFF2-40B4-BE49-F238E27FC236}">
+                <a16:creationId xmlns:a16="http://schemas.microsoft.com/office/drawing/2014/main" id="{9691CB7C-D9E5-1741-8DC4-1748D05D04FB}"/>
+              </a:ext>
+            </a:extLst>
+          </p:cNvPr>
+          <p:cNvCxnSpPr>
+            <a:cxnSpLocks/>
+            <a:stCxn id="33" idx="3"/>
+          </p:cNvCxnSpPr>
+          <p:nvPr/>
+        </p:nvCxnSpPr>
+        <p:spPr>
+          <a:xfrm flipV="1">
+            <a:off x="7545072" y="5899456"/>
+            <a:ext cx="2061265" cy="69670"/>
+          </a:xfrm>
+          <a:prstGeom prst="straightConnector1">
+            <a:avLst/>
+          </a:prstGeom>
+          <a:ln w="28575">
+            <a:tailEnd type="triangle"/>
+          </a:ln>
+        </p:spPr>
+        <p:style>
+          <a:lnRef idx="2">
+            <a:schemeClr val="dk1"/>
+          </a:lnRef>
+          <a:fillRef idx="0">
+            <a:schemeClr val="dk1"/>
+          </a:fillRef>
+          <a:effectRef idx="1">
+            <a:schemeClr val="dk1"/>
+          </a:effectRef>
+          <a:fontRef idx="minor">
+            <a:schemeClr val="tx1"/>
+          </a:fontRef>
+        </p:style>
+      </p:cxnSp>
+    </p:spTree>
+    <p:extLst>
+      <p:ext uri="{BB962C8B-B14F-4D97-AF65-F5344CB8AC3E}">
+        <p14:creationId xmlns:p14="http://schemas.microsoft.com/office/powerpoint/2010/main" val="1560439973"/>
+      </p:ext>
+    </p:extLst>
+  </p:cSld>
+  <p:clrMapOvr>
+    <a:masterClrMapping/>
+  </p:clrMapOvr>
 </p:sld>
 </file>
 
 <file path=ppt/slides/slide3.xml><?xml version="1.0" encoding="utf-8"?>
-<p:sld xmlns:a="http://schemas.openxmlformats.org/drawingml/2006/main" xmlns:r="http://schemas.openxmlformats.org/officeDocument/2006/relationships" xmlns:p="http://schemas.openxmlformats.org/presentationml/2006/main" showMasterSp="0">
+<p:sld xmlns:a="http://schemas.openxmlformats.org/drawingml/2006/main" xmlns:r="http://schemas.openxmlformats.org/officeDocument/2006/relationships" xmlns:p="http://schemas.openxmlformats.org/presentationml/2006/main" showMasterSp="0" show="0">
   <p:cSld>
     <p:bg>
       <p:bgPr>
@@ -6566,24 +6538,19 @@
             </a:pPr>
             <a:r>
               <a:rPr lang="en-US" sz="1400" dirty="0"/>
-              <a:t>On hang-up, minimize and </a:t>
-            </a:r>
-            <a:r>
-              <a:rPr lang="en-US" sz="1400" dirty="0" smtClean="0"/>
-              <a:t>hide</a:t>
+              <a:t>On hang-up, minimize and hide</a:t>
             </a:r>
             <a:r>
               <a:rPr lang="en-US" sz="1600" dirty="0"/>
               <a:t> </a:t>
             </a:r>
             <a:r>
-              <a:rPr lang="en-US" sz="1400" dirty="0" smtClean="0"/>
+              <a:rPr lang="en-US" sz="1400" dirty="0"/>
               <a:t>window without terminating media session</a:t>
             </a:r>
-            <a:endParaRPr lang="en-US" sz="1400" dirty="0"/>
-          </a:p>
-          <a:p>
-            <a:endParaRPr lang="en-US" sz="1600" dirty="0" smtClean="0"/>
+          </a:p>
+          <a:p>
+            <a:endParaRPr lang="en-US" sz="1600" dirty="0"/>
           </a:p>
           <a:p>
             <a:endParaRPr lang="en-US" sz="1600" dirty="0"/>
@@ -6686,8 +6653,8 @@
         </p:nvSpPr>
         <p:spPr>
           <a:xfrm>
-            <a:off x="123289" y="2435651"/>
-            <a:ext cx="11944475" cy="1309599"/>
+            <a:off x="123289" y="1998643"/>
+            <a:ext cx="11944475" cy="1746607"/>
           </a:xfrm>
           <a:prstGeom prst="roundRect">
             <a:avLst/>
@@ -6718,29 +6685,13 @@
           <a:lstStyle/>
           <a:p>
             <a:pPr algn="ctr"/>
-            <a:endParaRPr lang="en-US" sz="1600" b="1" u="sng" dirty="0" smtClean="0">
-              <a:solidFill>
-                <a:schemeClr val="tx1"/>
-              </a:solidFill>
-            </a:endParaRPr>
-          </a:p>
-          <a:p>
-            <a:pPr algn="ctr"/>
-            <a:r>
-              <a:rPr lang="en-US" sz="1600" b="1" u="sng" dirty="0" smtClean="0">
-                <a:solidFill>
-                  <a:schemeClr val="tx1"/>
-                </a:solidFill>
-              </a:rPr>
-              <a:t>Signaling </a:t>
-            </a:r>
             <a:r>
               <a:rPr lang="en-US" sz="1600" b="1" u="sng" dirty="0">
                 <a:solidFill>
                   <a:schemeClr val="tx1"/>
                 </a:solidFill>
               </a:rPr>
-              <a:t>Attack</a:t>
+              <a:t>Signaling Attack</a:t>
             </a:r>
           </a:p>
           <a:p>
@@ -6768,16 +6719,10 @@
                   <a:schemeClr val="tx1"/>
                 </a:solidFill>
               </a:rPr>
-              <a:t>Instead of directly connecting peers, connected them to </a:t>
-            </a:r>
-            <a:r>
-              <a:rPr lang="en-US" sz="1400" dirty="0" smtClean="0">
-                <a:solidFill>
-                  <a:schemeClr val="tx1"/>
-                </a:solidFill>
-              </a:rPr>
-              <a:t>attacker</a:t>
-            </a:r>
+              <a:t>Instead of directly connecting peers, connected them to attacker</a:t>
+            </a:r>
+          </a:p>
+          <a:p>
             <a:endParaRPr lang="en-US" sz="1600" dirty="0">
               <a:solidFill>
                 <a:schemeClr val="tx1"/>
@@ -6792,6 +6737,13 @@
             </a:endParaRPr>
           </a:p>
           <a:p>
+            <a:endParaRPr lang="en-US" sz="1600" dirty="0">
+              <a:solidFill>
+                <a:schemeClr val="tx1"/>
+              </a:solidFill>
+            </a:endParaRPr>
+          </a:p>
+          <a:p>
             <a:pPr marL="285750" indent="-285750">
               <a:buFont typeface="Arial" panose="020B0604020202020204" pitchFamily="34" charset="0"/>
               <a:buChar char="•"/>
@@ -6852,28 +6804,6 @@
               <a:buChar char="•"/>
             </a:pPr>
             <a:endParaRPr lang="en-US" dirty="0">
-              <a:solidFill>
-                <a:schemeClr val="tx1"/>
-              </a:solidFill>
-            </a:endParaRPr>
-          </a:p>
-          <a:p>
-            <a:pPr marL="285750" indent="-285750">
-              <a:buFont typeface="Arial" panose="020B0604020202020204" pitchFamily="34" charset="0"/>
-              <a:buChar char="•"/>
-            </a:pPr>
-            <a:endParaRPr lang="en-US" dirty="0">
-              <a:solidFill>
-                <a:schemeClr val="tx1"/>
-              </a:solidFill>
-            </a:endParaRPr>
-          </a:p>
-          <a:p>
-            <a:pPr marL="285750" indent="-285750">
-              <a:buFont typeface="Arial" panose="020B0604020202020204" pitchFamily="34" charset="0"/>
-              <a:buChar char="•"/>
-            </a:pPr>
-            <a:endParaRPr lang="en-US" dirty="0" smtClean="0">
               <a:solidFill>
                 <a:schemeClr val="tx1"/>
               </a:solidFill>
@@ -6952,29 +6882,30 @@
                   <a:schemeClr val="tx1"/>
                 </a:solidFill>
               </a:rPr>
-              <a:t>Attacker views </a:t>
-            </a:r>
-            <a:r>
-              <a:rPr lang="en-US" sz="1400" dirty="0" smtClean="0">
+              <a:t>Attacker views audio/video streams of users</a:t>
+            </a:r>
+          </a:p>
+          <a:p>
+            <a:pPr marL="285750" indent="-285750">
+              <a:buFont typeface="Arial" panose="020B0604020202020204" pitchFamily="34" charset="0"/>
+              <a:buChar char="•"/>
+            </a:pPr>
+            <a:r>
+              <a:rPr lang="en-US" sz="1400" dirty="0">
                 <a:solidFill>
                   <a:schemeClr val="tx1"/>
                 </a:solidFill>
               </a:rPr>
-              <a:t>users’ media without them knowing</a:t>
-            </a:r>
-            <a:endParaRPr lang="en-US" sz="1400" dirty="0">
-              <a:solidFill>
-                <a:schemeClr val="tx1"/>
-              </a:solidFill>
-            </a:endParaRPr>
-          </a:p>
-          <a:p>
-            <a:pPr marL="285750" indent="-285750">
-              <a:buFont typeface="Arial" panose="020B0604020202020204" pitchFamily="34" charset="0"/>
-              <a:buChar char="•"/>
-            </a:pPr>
-            <a:r>
-              <a:rPr lang="en-US" sz="1400" dirty="0" smtClean="0">
+              <a:t>Users remain unaware of attacker’s presence</a:t>
+            </a:r>
+          </a:p>
+          <a:p>
+            <a:pPr marL="285750" indent="-285750">
+              <a:buFont typeface="Arial" panose="020B0604020202020204" pitchFamily="34" charset="0"/>
+              <a:buChar char="•"/>
+            </a:pPr>
+            <a:r>
+              <a:rPr lang="en-US" sz="1400" dirty="0">
                 <a:solidFill>
                   <a:schemeClr val="tx1"/>
                 </a:solidFill>
@@ -7030,10 +6961,6 @@
               <a:rPr lang="en-US" sz="3100" b="1" dirty="0"/>
               <a:t>acking WebRTC: An Analysis of Videoconferencing Vulnerabilities</a:t>
             </a:r>
-            <a:r>
-              <a:rPr lang="en-US" sz="4000" dirty="0"/>
-              <a:t/>
-            </a:r>
             <a:br>
               <a:rPr lang="en-US" sz="4000" dirty="0"/>
             </a:br>
@@ -7059,7 +6986,7 @@
         <p:spPr>
           <a:xfrm>
             <a:off x="123289" y="873000"/>
-            <a:ext cx="5864556" cy="1498358"/>
+            <a:ext cx="3688423" cy="902721"/>
           </a:xfrm>
           <a:prstGeom prst="roundRect">
             <a:avLst/>
@@ -7080,7 +7007,7 @@
           </a:fontRef>
         </p:style>
         <p:txBody>
-          <a:bodyPr numCol="2" rtlCol="0" anchor="ctr"/>
+          <a:bodyPr rtlCol="0" anchor="ctr"/>
           <a:lstStyle/>
           <a:p>
             <a:pPr algn="ctr"/>
@@ -7106,69 +7033,8 @@
             </a:pPr>
             <a:r>
               <a:rPr lang="en-US" sz="1200" dirty="0"/>
-              <a:t>Automatically enabled in many </a:t>
-            </a:r>
-            <a:r>
-              <a:rPr lang="en-US" sz="1200" dirty="0" smtClean="0"/>
-              <a:t>browsers</a:t>
-            </a:r>
-          </a:p>
-          <a:p>
-            <a:endParaRPr lang="en-US" sz="1200" dirty="0" smtClean="0"/>
-          </a:p>
-          <a:p>
-            <a:pPr algn="ctr"/>
-            <a:r>
-              <a:rPr lang="en-US" sz="1200" b="1" dirty="0" smtClean="0"/>
-              <a:t>Focus</a:t>
-            </a:r>
-          </a:p>
-          <a:p>
-            <a:pPr marL="285750" indent="-285750">
-              <a:buFont typeface="Arial" panose="020B0604020202020204" pitchFamily="34" charset="0"/>
-              <a:buChar char="•"/>
-            </a:pPr>
-            <a:r>
-              <a:rPr lang="en-US" sz="1200" dirty="0" smtClean="0"/>
-              <a:t>Where </a:t>
-            </a:r>
-            <a:r>
-              <a:rPr lang="en-US" sz="1200" dirty="0"/>
-              <a:t>is </a:t>
-            </a:r>
-            <a:r>
-              <a:rPr lang="en-US" sz="1200" dirty="0" err="1"/>
-              <a:t>WebRTC</a:t>
-            </a:r>
-            <a:r>
-              <a:rPr lang="en-US" sz="1200" dirty="0"/>
-              <a:t> vulnerable?</a:t>
-            </a:r>
-          </a:p>
-          <a:p>
-            <a:pPr marL="285750" indent="-285750">
-              <a:buFont typeface="Arial" panose="020B0604020202020204" pitchFamily="34" charset="0"/>
-              <a:buChar char="•"/>
-            </a:pPr>
-            <a:r>
-              <a:rPr lang="en-US" sz="1200" dirty="0"/>
-              <a:t>What sort of attacks could be performed?</a:t>
-            </a:r>
-          </a:p>
-          <a:p>
-            <a:pPr marL="285750" indent="-285750">
-              <a:buFont typeface="Arial" panose="020B0604020202020204" pitchFamily="34" charset="0"/>
-              <a:buChar char="•"/>
-            </a:pPr>
-            <a:r>
-              <a:rPr lang="en-US" sz="1200" dirty="0"/>
-              <a:t>What information could these attacks leak</a:t>
-            </a:r>
-            <a:r>
-              <a:rPr lang="en-US" sz="1200" dirty="0" smtClean="0"/>
-              <a:t>?</a:t>
-            </a:r>
-            <a:endParaRPr lang="en-US" sz="1200" dirty="0" smtClean="0"/>
+              <a:t>Automatically enabled in many browsers</a:t>
+            </a:r>
           </a:p>
           <a:p>
             <a:endParaRPr lang="en-US" sz="1200" dirty="0"/>
@@ -7177,10 +7043,10 @@
       </p:sp>
       <p:sp>
         <p:nvSpPr>
-          <p:cNvPr id="38" name="Rounded Rectangle 37">
+          <p:cNvPr id="37" name="Rounded Rectangle 36">
             <a:extLst>
               <a:ext uri="{FF2B5EF4-FFF2-40B4-BE49-F238E27FC236}">
-                <a16:creationId xmlns:a16="http://schemas.microsoft.com/office/drawing/2014/main" id="{3E679D60-2887-954A-9FF5-84ECD887DDA9}"/>
+                <a16:creationId xmlns:a16="http://schemas.microsoft.com/office/drawing/2014/main" id="{C1082FBE-955C-284B-BAAF-C3C5CCFCD8B5}"/>
               </a:ext>
             </a:extLst>
           </p:cNvPr>
@@ -7189,8 +7055,8 @@
         </p:nvSpPr>
         <p:spPr>
           <a:xfrm>
-            <a:off x="6125498" y="873000"/>
-            <a:ext cx="5939152" cy="1498358"/>
+            <a:off x="4251788" y="878760"/>
+            <a:ext cx="3688423" cy="902721"/>
           </a:xfrm>
           <a:prstGeom prst="roundRect">
             <a:avLst/>
@@ -7217,6 +7083,86 @@
             <a:pPr algn="ctr"/>
             <a:r>
               <a:rPr lang="en-US" sz="1200" b="1" dirty="0"/>
+              <a:t>Research Questions</a:t>
+            </a:r>
+          </a:p>
+          <a:p>
+            <a:pPr marL="285750" indent="-285750">
+              <a:buFont typeface="Arial" panose="020B0604020202020204" pitchFamily="34" charset="0"/>
+              <a:buChar char="•"/>
+            </a:pPr>
+            <a:r>
+              <a:rPr lang="en-US" sz="1200" dirty="0"/>
+              <a:t>Where is WebRTC vulnerable?</a:t>
+            </a:r>
+          </a:p>
+          <a:p>
+            <a:pPr marL="285750" indent="-285750">
+              <a:buFont typeface="Arial" panose="020B0604020202020204" pitchFamily="34" charset="0"/>
+              <a:buChar char="•"/>
+            </a:pPr>
+            <a:r>
+              <a:rPr lang="en-US" sz="1200" dirty="0"/>
+              <a:t>What sort of attacks could be performed?</a:t>
+            </a:r>
+          </a:p>
+          <a:p>
+            <a:pPr marL="285750" indent="-285750">
+              <a:buFont typeface="Arial" panose="020B0604020202020204" pitchFamily="34" charset="0"/>
+              <a:buChar char="•"/>
+            </a:pPr>
+            <a:r>
+              <a:rPr lang="en-US" sz="1200" dirty="0"/>
+              <a:t>What information could these attacks leak?</a:t>
+            </a:r>
+          </a:p>
+          <a:p>
+            <a:endParaRPr lang="en-US" sz="1400" dirty="0"/>
+          </a:p>
+        </p:txBody>
+      </p:sp>
+      <p:sp>
+        <p:nvSpPr>
+          <p:cNvPr id="38" name="Rounded Rectangle 37">
+            <a:extLst>
+              <a:ext uri="{FF2B5EF4-FFF2-40B4-BE49-F238E27FC236}">
+                <a16:creationId xmlns:a16="http://schemas.microsoft.com/office/drawing/2014/main" id="{3E679D60-2887-954A-9FF5-84ECD887DDA9}"/>
+              </a:ext>
+            </a:extLst>
+          </p:cNvPr>
+          <p:cNvSpPr/>
+          <p:nvPr/>
+        </p:nvSpPr>
+        <p:spPr>
+          <a:xfrm>
+            <a:off x="8258709" y="873000"/>
+            <a:ext cx="3688423" cy="902721"/>
+          </a:xfrm>
+          <a:prstGeom prst="roundRect">
+            <a:avLst/>
+          </a:prstGeom>
+        </p:spPr>
+        <p:style>
+          <a:lnRef idx="2">
+            <a:schemeClr val="dk1"/>
+          </a:lnRef>
+          <a:fillRef idx="1">
+            <a:schemeClr val="lt1"/>
+          </a:fillRef>
+          <a:effectRef idx="0">
+            <a:schemeClr val="dk1"/>
+          </a:effectRef>
+          <a:fontRef idx="minor">
+            <a:schemeClr val="dk1"/>
+          </a:fontRef>
+        </p:style>
+        <p:txBody>
+          <a:bodyPr rtlCol="0" anchor="ctr"/>
+          <a:lstStyle/>
+          <a:p>
+            <a:pPr algn="ctr"/>
+            <a:r>
+              <a:rPr lang="en-US" sz="1200" b="1" dirty="0"/>
               <a:t>Conclusions</a:t>
             </a:r>
           </a:p>
@@ -7243,40 +7189,6 @@
               <a:rPr lang="en-US" sz="1200" dirty="0"/>
               <a:t>Exploitations can compromise user privacy and reveal information such as IP addresses</a:t>
             </a:r>
-          </a:p>
-        </p:txBody>
-      </p:sp>
-      <p:sp>
-        <p:nvSpPr>
-          <p:cNvPr id="59" name="TextBox 58"/>
-          <p:cNvSpPr txBox="1"/>
-          <p:nvPr/>
-        </p:nvSpPr>
-        <p:spPr>
-          <a:xfrm>
-            <a:off x="7010402" y="2949360"/>
-            <a:ext cx="2035277" cy="369332"/>
-          </a:xfrm>
-          <a:prstGeom prst="rect">
-            <a:avLst/>
-          </a:prstGeom>
-          <a:noFill/>
-        </p:spPr>
-        <p:txBody>
-          <a:bodyPr wrap="square" rtlCol="0">
-            <a:spAutoFit/>
-          </a:bodyPr>
-          <a:lstStyle/>
-          <a:p>
-            <a:r>
-              <a:rPr lang="en-US" b="1" dirty="0" err="1" smtClean="0"/>
-              <a:t>WebRTC</a:t>
-            </a:r>
-            <a:r>
-              <a:rPr lang="en-US" b="1" dirty="0" smtClean="0"/>
-              <a:t> Signaling</a:t>
-            </a:r>
-            <a:endParaRPr lang="en-US" b="1" dirty="0"/>
           </a:p>
         </p:txBody>
       </p:sp>
@@ -7385,8 +7297,8 @@
         </p:blipFill>
         <p:spPr bwMode="auto">
           <a:xfrm>
-            <a:off x="5514029" y="2675462"/>
-            <a:ext cx="1222938" cy="1222938"/>
+            <a:off x="5440849" y="2180452"/>
+            <a:ext cx="1309353" cy="1309353"/>
           </a:xfrm>
           <a:prstGeom prst="rect">
             <a:avLst/>
@@ -7414,8 +7326,8 @@
         </p:nvCxnSpPr>
         <p:spPr>
           <a:xfrm flipV="1">
-            <a:off x="3796052" y="3286931"/>
-            <a:ext cx="1717977" cy="696897"/>
+            <a:off x="3796052" y="2835129"/>
+            <a:ext cx="1644797" cy="1148699"/>
           </a:xfrm>
           <a:prstGeom prst="straightConnector1">
             <a:avLst/>
@@ -7451,8 +7363,8 @@
         </p:nvCxnSpPr>
         <p:spPr>
           <a:xfrm>
-            <a:off x="6736967" y="3286931"/>
-            <a:ext cx="1527570" cy="696897"/>
+            <a:off x="6750202" y="2835129"/>
+            <a:ext cx="1514335" cy="1148699"/>
           </a:xfrm>
           <a:prstGeom prst="straightConnector1">
             <a:avLst/>
@@ -7634,7 +7546,7 @@
         </p:nvSpPr>
         <p:spPr>
           <a:xfrm>
-            <a:off x="5265182" y="2464736"/>
+            <a:off x="5166860" y="1963290"/>
             <a:ext cx="1726867" cy="369332"/>
           </a:xfrm>
           <a:prstGeom prst="rect">
@@ -7650,10 +7562,9 @@
           <a:p>
             <a:pPr algn="ctr"/>
             <a:r>
-              <a:rPr lang="en-US" b="1" dirty="0" smtClean="0"/>
+              <a:rPr lang="en-US" b="1" dirty="0"/>
               <a:t>Signal Server</a:t>
             </a:r>
-            <a:endParaRPr lang="en-US" b="1" dirty="0"/>
           </a:p>
         </p:txBody>
       </p:sp>
@@ -7680,10 +7591,42 @@
           <a:lstStyle/>
           <a:p>
             <a:r>
-              <a:rPr lang="en-US" b="1" dirty="0" smtClean="0"/>
+              <a:rPr lang="en-US" b="1" dirty="0"/>
               <a:t>Media Stream</a:t>
             </a:r>
-            <a:endParaRPr lang="en-US" b="1" dirty="0"/>
+          </a:p>
+        </p:txBody>
+      </p:sp>
+      <p:sp>
+        <p:nvSpPr>
+          <p:cNvPr id="59" name="TextBox 58"/>
+          <p:cNvSpPr txBox="1"/>
+          <p:nvPr/>
+        </p:nvSpPr>
+        <p:spPr>
+          <a:xfrm>
+            <a:off x="7118555" y="2821540"/>
+            <a:ext cx="2035277" cy="369332"/>
+          </a:xfrm>
+          <a:prstGeom prst="rect">
+            <a:avLst/>
+          </a:prstGeom>
+          <a:noFill/>
+        </p:spPr>
+        <p:txBody>
+          <a:bodyPr wrap="square" rtlCol="0">
+            <a:spAutoFit/>
+          </a:bodyPr>
+          <a:lstStyle/>
+          <a:p>
+            <a:r>
+              <a:rPr lang="en-US" b="1" dirty="0" err="1"/>
+              <a:t>WebRTC</a:t>
+            </a:r>
+            <a:r>
+              <a:rPr lang="en-US" b="1" dirty="0"/>
+              <a:t> Signaling</a:t>
+            </a:r>
           </a:p>
         </p:txBody>
       </p:sp>
@@ -7710,10 +7653,9 @@
           <a:lstStyle/>
           <a:p>
             <a:r>
-              <a:rPr lang="en-US" b="1" dirty="0" smtClean="0"/>
+              <a:rPr lang="en-US" b="1" dirty="0"/>
               <a:t>TURN Server</a:t>
             </a:r>
-            <a:endParaRPr lang="en-US" b="1" dirty="0"/>
           </a:p>
         </p:txBody>
       </p:sp>
@@ -7740,10 +7682,9 @@
           <a:lstStyle/>
           <a:p>
             <a:r>
-              <a:rPr lang="en-US" b="1" dirty="0" smtClean="0"/>
+              <a:rPr lang="en-US" b="1" dirty="0"/>
               <a:t>Stream Relay</a:t>
             </a:r>
-            <a:endParaRPr lang="en-US" b="1" dirty="0"/>
           </a:p>
         </p:txBody>
       </p:sp>
@@ -7791,25 +7732,18 @@
     </p:spTree>
     <p:extLst>
       <p:ext uri="{BB962C8B-B14F-4D97-AF65-F5344CB8AC3E}">
-        <p14:creationId xmlns:p14="http://schemas.microsoft.com/office/powerpoint/2010/main" val="3697997854"/>
+        <p14:creationId xmlns:p14="http://schemas.microsoft.com/office/powerpoint/2010/main" val="2553913166"/>
       </p:ext>
     </p:extLst>
   </p:cSld>
   <p:clrMapOvr>
     <a:masterClrMapping/>
   </p:clrMapOvr>
-  <p:timing>
-    <p:tnLst>
-      <p:par>
-        <p:cTn id="1" dur="indefinite" restart="never" nodeType="tmRoot"/>
-      </p:par>
-    </p:tnLst>
-  </p:timing>
 </p:sld>
 </file>
 
 <file path=ppt/slides/slide4.xml><?xml version="1.0" encoding="utf-8"?>
-<p:sld xmlns:a="http://schemas.openxmlformats.org/drawingml/2006/main" xmlns:r="http://schemas.openxmlformats.org/officeDocument/2006/relationships" xmlns:p="http://schemas.openxmlformats.org/presentationml/2006/main" showMasterSp="0">
+<p:sld xmlns:a="http://schemas.openxmlformats.org/drawingml/2006/main" xmlns:r="http://schemas.openxmlformats.org/officeDocument/2006/relationships" xmlns:p="http://schemas.openxmlformats.org/presentationml/2006/main" showMasterSp="0" show="0">
   <p:cSld>
     <p:bg>
       <p:bgPr>
@@ -8069,24 +8003,19 @@
             </a:pPr>
             <a:r>
               <a:rPr lang="en-US" sz="1400" dirty="0"/>
-              <a:t>On hang-up, minimize and </a:t>
-            </a:r>
-            <a:r>
-              <a:rPr lang="en-US" sz="1400" dirty="0" smtClean="0"/>
-              <a:t>hide</a:t>
+              <a:t>On hang-up, minimize and hide</a:t>
             </a:r>
             <a:r>
               <a:rPr lang="en-US" sz="1600" dirty="0"/>
               <a:t> </a:t>
             </a:r>
             <a:r>
-              <a:rPr lang="en-US" sz="1400" dirty="0" smtClean="0"/>
+              <a:rPr lang="en-US" sz="1400" dirty="0"/>
               <a:t>window without terminating media session</a:t>
             </a:r>
-            <a:endParaRPr lang="en-US" sz="1400" dirty="0"/>
-          </a:p>
-          <a:p>
-            <a:endParaRPr lang="en-US" sz="1600" dirty="0" smtClean="0"/>
+          </a:p>
+          <a:p>
+            <a:endParaRPr lang="en-US" sz="1600" dirty="0"/>
           </a:p>
           <a:p>
             <a:endParaRPr lang="en-US" sz="1600" dirty="0"/>
@@ -8222,20 +8151,12 @@
           <a:p>
             <a:pPr algn="ctr"/>
             <a:r>
-              <a:rPr lang="en-US" sz="1600" b="1" u="sng" dirty="0" smtClean="0">
-                <a:solidFill>
-                  <a:schemeClr val="tx1"/>
-                </a:solidFill>
-              </a:rPr>
-              <a:t>Signaling </a:t>
-            </a:r>
-            <a:r>
               <a:rPr lang="en-US" sz="1600" b="1" u="sng" dirty="0">
                 <a:solidFill>
                   <a:schemeClr val="tx1"/>
                 </a:solidFill>
               </a:rPr>
-              <a:t>Attack</a:t>
+              <a:t>Signaling Attack</a:t>
             </a:r>
           </a:p>
           <a:p>
@@ -8440,24 +8361,16 @@
                   <a:schemeClr val="tx1"/>
                 </a:solidFill>
               </a:rPr>
-              <a:t>Users remain unaware of attacker’s </a:t>
-            </a:r>
-            <a:r>
-              <a:rPr lang="en-US" sz="1400" dirty="0" smtClean="0">
-                <a:solidFill>
-                  <a:schemeClr val="tx1"/>
-                </a:solidFill>
-              </a:rPr>
-              <a:t>presence</a:t>
-            </a:r>
-          </a:p>
-          <a:p>
-            <a:pPr marL="285750" indent="-285750">
-              <a:buFont typeface="Arial" panose="020B0604020202020204" pitchFamily="34" charset="0"/>
-              <a:buChar char="•"/>
-            </a:pPr>
-            <a:r>
-              <a:rPr lang="en-US" sz="1400" dirty="0" smtClean="0">
+              <a:t>Users remain unaware of attacker’s presence</a:t>
+            </a:r>
+          </a:p>
+          <a:p>
+            <a:pPr marL="285750" indent="-285750">
+              <a:buFont typeface="Arial" panose="020B0604020202020204" pitchFamily="34" charset="0"/>
+              <a:buChar char="•"/>
+            </a:pPr>
+            <a:r>
+              <a:rPr lang="en-US" sz="1400" dirty="0">
                 <a:solidFill>
                   <a:schemeClr val="tx1"/>
                 </a:solidFill>
@@ -8512,10 +8425,6 @@
             <a:r>
               <a:rPr lang="en-US" sz="3100" b="1" dirty="0"/>
               <a:t>acking WebRTC: An Analysis of Videoconferencing Vulnerabilities</a:t>
-            </a:r>
-            <a:r>
-              <a:rPr lang="en-US" sz="4000" dirty="0"/>
-              <a:t/>
             </a:r>
             <a:br>
               <a:rPr lang="en-US" sz="4000" dirty="0"/>
@@ -8589,11 +8498,7 @@
             </a:pPr>
             <a:r>
               <a:rPr lang="en-US" sz="1200" dirty="0"/>
-              <a:t>Automatically enabled in many </a:t>
-            </a:r>
-            <a:r>
-              <a:rPr lang="en-US" sz="1200" dirty="0" smtClean="0"/>
-              <a:t>browsers</a:t>
+              <a:t>Automatically enabled in many browsers</a:t>
             </a:r>
           </a:p>
           <a:p>
@@ -8673,11 +8578,7 @@
             </a:pPr>
             <a:r>
               <a:rPr lang="en-US" sz="1200" dirty="0"/>
-              <a:t>What information could these attacks leak</a:t>
-            </a:r>
-            <a:r>
-              <a:rPr lang="en-US" sz="1200" dirty="0" smtClean="0"/>
-              <a:t>?</a:t>
+              <a:t>What information could these attacks leak?</a:t>
             </a:r>
           </a:p>
           <a:p>
@@ -9126,10 +9027,9 @@
           <a:p>
             <a:pPr algn="ctr"/>
             <a:r>
-              <a:rPr lang="en-US" b="1" dirty="0" smtClean="0"/>
+              <a:rPr lang="en-US" b="1" dirty="0"/>
               <a:t>Signal Server</a:t>
             </a:r>
-            <a:endParaRPr lang="en-US" b="1" dirty="0"/>
           </a:p>
         </p:txBody>
       </p:sp>
@@ -9156,10 +9056,9 @@
           <a:lstStyle/>
           <a:p>
             <a:r>
-              <a:rPr lang="en-US" b="1" dirty="0" smtClean="0"/>
+              <a:rPr lang="en-US" b="1" dirty="0"/>
               <a:t>Media Stream</a:t>
             </a:r>
-            <a:endParaRPr lang="en-US" b="1" dirty="0"/>
           </a:p>
         </p:txBody>
       </p:sp>
@@ -9186,14 +9085,13 @@
           <a:lstStyle/>
           <a:p>
             <a:r>
-              <a:rPr lang="en-US" b="1" dirty="0" err="1" smtClean="0"/>
+              <a:rPr lang="en-US" b="1" dirty="0" err="1"/>
               <a:t>WebRTC</a:t>
             </a:r>
             <a:r>
-              <a:rPr lang="en-US" b="1" dirty="0" smtClean="0"/>
+              <a:rPr lang="en-US" b="1" dirty="0"/>
               <a:t> Signaling</a:t>
             </a:r>
-            <a:endParaRPr lang="en-US" b="1" dirty="0"/>
           </a:p>
         </p:txBody>
       </p:sp>
@@ -9220,10 +9118,9 @@
           <a:lstStyle/>
           <a:p>
             <a:r>
-              <a:rPr lang="en-US" b="1" dirty="0" smtClean="0"/>
+              <a:rPr lang="en-US" b="1" dirty="0"/>
               <a:t>TURN Server</a:t>
             </a:r>
-            <a:endParaRPr lang="en-US" b="1" dirty="0"/>
           </a:p>
         </p:txBody>
       </p:sp>
@@ -9250,10 +9147,9 @@
           <a:lstStyle/>
           <a:p>
             <a:r>
-              <a:rPr lang="en-US" b="1" dirty="0" smtClean="0"/>
+              <a:rPr lang="en-US" b="1" dirty="0"/>
               <a:t>Stream Relay</a:t>
             </a:r>
-            <a:endParaRPr lang="en-US" b="1" dirty="0"/>
           </a:p>
         </p:txBody>
       </p:sp>
@@ -9374,13 +9270,6 @@
   <p:clrMapOvr>
     <a:masterClrMapping/>
   </p:clrMapOvr>
-  <p:timing>
-    <p:tnLst>
-      <p:par>
-        <p:cTn id="1" dur="indefinite" restart="never" nodeType="tmRoot"/>
-      </p:par>
-    </p:tnLst>
-  </p:timing>
 </p:sld>
 </file>
 

</xml_diff>